<commit_message>
Moved stuff around in main.js
</commit_message>
<xml_diff>
--- a/notes/demo.pptx
+++ b/notes/demo.pptx
@@ -11,7 +11,15 @@
     <p:sldId id="263" r:id="rId5"/>
     <p:sldId id="261" r:id="rId6"/>
     <p:sldId id="259" r:id="rId7"/>
-    <p:sldId id="262" r:id="rId8"/>
+    <p:sldId id="264" r:id="rId8"/>
+    <p:sldId id="265" r:id="rId9"/>
+    <p:sldId id="266" r:id="rId10"/>
+    <p:sldId id="267" r:id="rId11"/>
+    <p:sldId id="268" r:id="rId12"/>
+    <p:sldId id="269" r:id="rId13"/>
+    <p:sldId id="270" r:id="rId14"/>
+    <p:sldId id="271" r:id="rId15"/>
+    <p:sldId id="272" r:id="rId16"/>
   </p:sldIdLst>
   <p:sldSz cx="12192000" cy="6858000"/>
   <p:notesSz cx="6858000" cy="9144000"/>
@@ -3816,6 +3824,2110 @@
 </p:sld>
 </file>
 
+<file path=ppt/slides/slide10.xml><?xml version="1.0" encoding="utf-8"?>
+<p:sld xmlns:a="http://schemas.openxmlformats.org/drawingml/2006/main" xmlns:r="http://schemas.openxmlformats.org/officeDocument/2006/relationships" xmlns:p="http://schemas.openxmlformats.org/presentationml/2006/main">
+  <p:cSld>
+    <p:spTree>
+      <p:nvGrpSpPr>
+        <p:cNvPr id="1" name=""/>
+        <p:cNvGrpSpPr/>
+        <p:nvPr/>
+      </p:nvGrpSpPr>
+      <p:grpSpPr>
+        <a:xfrm>
+          <a:off x="0" y="0"/>
+          <a:ext cx="0" cy="0"/>
+          <a:chOff x="0" y="0"/>
+          <a:chExt cx="0" cy="0"/>
+        </a:xfrm>
+      </p:grpSpPr>
+      <p:sp>
+        <p:nvSpPr>
+          <p:cNvPr id="2" name="Title 1"/>
+          <p:cNvSpPr>
+            <a:spLocks noGrp="1"/>
+          </p:cNvSpPr>
+          <p:nvPr>
+            <p:ph type="title"/>
+          </p:nvPr>
+        </p:nvSpPr>
+        <p:spPr/>
+        <p:txBody>
+          <a:bodyPr/>
+          <a:lstStyle/>
+          <a:p>
+            <a:r>
+              <a:rPr lang="en-US" dirty="0" smtClean="0"/>
+              <a:t>Scene</a:t>
+            </a:r>
+            <a:endParaRPr lang="en-US" dirty="0"/>
+          </a:p>
+        </p:txBody>
+      </p:sp>
+      <p:sp>
+        <p:nvSpPr>
+          <p:cNvPr id="3" name="Content Placeholder 2"/>
+          <p:cNvSpPr>
+            <a:spLocks noGrp="1"/>
+          </p:cNvSpPr>
+          <p:nvPr>
+            <p:ph idx="1"/>
+          </p:nvPr>
+        </p:nvSpPr>
+        <p:spPr/>
+        <p:txBody>
+          <a:bodyPr/>
+          <a:lstStyle/>
+          <a:p>
+            <a:r>
+              <a:rPr lang="en-US" dirty="0" err="1" smtClean="0">
+                <a:solidFill>
+                  <a:srgbClr val="00BFBF"/>
+                </a:solidFill>
+                <a:latin typeface="Lucida Console" panose="020B0609040504020204" pitchFamily="49" charset="0"/>
+              </a:rPr>
+              <a:t>this</a:t>
+            </a:r>
+            <a:r>
+              <a:rPr lang="en-US" dirty="0" err="1" smtClean="0">
+                <a:solidFill>
+                  <a:prstClr val="black"/>
+                </a:solidFill>
+                <a:latin typeface="Lucida Console" panose="020B0609040504020204" pitchFamily="49" charset="0"/>
+              </a:rPr>
+              <a:t>.scene</a:t>
+            </a:r>
+            <a:r>
+              <a:rPr lang="en-US" dirty="0" smtClean="0">
+                <a:solidFill>
+                  <a:prstClr val="black"/>
+                </a:solidFill>
+                <a:latin typeface="Lucida Console" panose="020B0609040504020204" pitchFamily="49" charset="0"/>
+              </a:rPr>
+              <a:t> </a:t>
+            </a:r>
+            <a:r>
+              <a:rPr lang="en-US" dirty="0">
+                <a:solidFill>
+                  <a:prstClr val="black"/>
+                </a:solidFill>
+                <a:latin typeface="Lucida Console" panose="020B0609040504020204" pitchFamily="49" charset="0"/>
+              </a:rPr>
+              <a:t>= </a:t>
+            </a:r>
+            <a:r>
+              <a:rPr lang="en-US" dirty="0">
+                <a:solidFill>
+                  <a:srgbClr val="BFBF00"/>
+                </a:solidFill>
+                <a:latin typeface="Lucida Console" panose="020B0609040504020204" pitchFamily="49" charset="0"/>
+              </a:rPr>
+              <a:t>new</a:t>
+            </a:r>
+            <a:r>
+              <a:rPr lang="en-US" dirty="0">
+                <a:solidFill>
+                  <a:prstClr val="black"/>
+                </a:solidFill>
+                <a:latin typeface="Lucida Console" panose="020B0609040504020204" pitchFamily="49" charset="0"/>
+              </a:rPr>
+              <a:t> </a:t>
+            </a:r>
+            <a:r>
+              <a:rPr lang="en-US" dirty="0" err="1">
+                <a:solidFill>
+                  <a:prstClr val="black"/>
+                </a:solidFill>
+                <a:latin typeface="Lucida Console" panose="020B0609040504020204" pitchFamily="49" charset="0"/>
+              </a:rPr>
+              <a:t>Physijs.Scene</a:t>
+            </a:r>
+            <a:r>
+              <a:rPr lang="en-US" dirty="0">
+                <a:solidFill>
+                  <a:prstClr val="black"/>
+                </a:solidFill>
+                <a:latin typeface="Lucida Console" panose="020B0609040504020204" pitchFamily="49" charset="0"/>
+              </a:rPr>
+              <a:t>;</a:t>
+            </a:r>
+            <a:endParaRPr lang="en-US" dirty="0"/>
+          </a:p>
+        </p:txBody>
+      </p:sp>
+    </p:spTree>
+    <p:extLst>
+      <p:ext uri="{BB962C8B-B14F-4D97-AF65-F5344CB8AC3E}">
+        <p14:creationId xmlns:p14="http://schemas.microsoft.com/office/powerpoint/2010/main" val="3127903324"/>
+      </p:ext>
+    </p:extLst>
+  </p:cSld>
+  <p:clrMapOvr>
+    <a:masterClrMapping/>
+  </p:clrMapOvr>
+</p:sld>
+</file>
+
+<file path=ppt/slides/slide11.xml><?xml version="1.0" encoding="utf-8"?>
+<p:sld xmlns:a="http://schemas.openxmlformats.org/drawingml/2006/main" xmlns:r="http://schemas.openxmlformats.org/officeDocument/2006/relationships" xmlns:p="http://schemas.openxmlformats.org/presentationml/2006/main">
+  <p:cSld>
+    <p:spTree>
+      <p:nvGrpSpPr>
+        <p:cNvPr id="1" name=""/>
+        <p:cNvGrpSpPr/>
+        <p:nvPr/>
+      </p:nvGrpSpPr>
+      <p:grpSpPr>
+        <a:xfrm>
+          <a:off x="0" y="0"/>
+          <a:ext cx="0" cy="0"/>
+          <a:chOff x="0" y="0"/>
+          <a:chExt cx="0" cy="0"/>
+        </a:xfrm>
+      </p:grpSpPr>
+      <p:sp>
+        <p:nvSpPr>
+          <p:cNvPr id="2" name="Title 1"/>
+          <p:cNvSpPr>
+            <a:spLocks noGrp="1"/>
+          </p:cNvSpPr>
+          <p:nvPr>
+            <p:ph type="title"/>
+          </p:nvPr>
+        </p:nvSpPr>
+        <p:spPr/>
+        <p:txBody>
+          <a:bodyPr/>
+          <a:lstStyle/>
+          <a:p>
+            <a:r>
+              <a:rPr lang="en-US" dirty="0" smtClean="0"/>
+              <a:t>Camera</a:t>
+            </a:r>
+            <a:endParaRPr lang="en-US" dirty="0"/>
+          </a:p>
+        </p:txBody>
+      </p:sp>
+      <p:sp>
+        <p:nvSpPr>
+          <p:cNvPr id="3" name="Content Placeholder 2"/>
+          <p:cNvSpPr>
+            <a:spLocks noGrp="1"/>
+          </p:cNvSpPr>
+          <p:nvPr>
+            <p:ph idx="1"/>
+          </p:nvPr>
+        </p:nvSpPr>
+        <p:spPr>
+          <a:xfrm>
+            <a:off x="1097279" y="1691186"/>
+            <a:ext cx="10777041" cy="4023360"/>
+          </a:xfrm>
+        </p:spPr>
+        <p:txBody>
+          <a:bodyPr/>
+          <a:lstStyle/>
+          <a:p>
+            <a:r>
+              <a:rPr lang="en-US" dirty="0" err="1" smtClean="0">
+                <a:solidFill>
+                  <a:srgbClr val="00BFBF"/>
+                </a:solidFill>
+                <a:latin typeface="Lucida Console" panose="020B0609040504020204" pitchFamily="49" charset="0"/>
+              </a:rPr>
+              <a:t>this</a:t>
+            </a:r>
+            <a:r>
+              <a:rPr lang="en-US" dirty="0" err="1" smtClean="0">
+                <a:solidFill>
+                  <a:prstClr val="black"/>
+                </a:solidFill>
+                <a:latin typeface="Lucida Console" panose="020B0609040504020204" pitchFamily="49" charset="0"/>
+              </a:rPr>
+              <a:t>.camera</a:t>
+            </a:r>
+            <a:r>
+              <a:rPr lang="en-US" dirty="0" smtClean="0">
+                <a:solidFill>
+                  <a:prstClr val="black"/>
+                </a:solidFill>
+                <a:latin typeface="Lucida Console" panose="020B0609040504020204" pitchFamily="49" charset="0"/>
+              </a:rPr>
+              <a:t> </a:t>
+            </a:r>
+            <a:r>
+              <a:rPr lang="en-US" dirty="0">
+                <a:solidFill>
+                  <a:prstClr val="black"/>
+                </a:solidFill>
+                <a:latin typeface="Lucida Console" panose="020B0609040504020204" pitchFamily="49" charset="0"/>
+              </a:rPr>
+              <a:t>= </a:t>
+            </a:r>
+            <a:r>
+              <a:rPr lang="en-US" dirty="0">
+                <a:solidFill>
+                  <a:srgbClr val="BFBF00"/>
+                </a:solidFill>
+                <a:latin typeface="Lucida Console" panose="020B0609040504020204" pitchFamily="49" charset="0"/>
+              </a:rPr>
+              <a:t>new</a:t>
+            </a:r>
+            <a:r>
+              <a:rPr lang="en-US" dirty="0">
+                <a:solidFill>
+                  <a:prstClr val="black"/>
+                </a:solidFill>
+                <a:latin typeface="Lucida Console" panose="020B0609040504020204" pitchFamily="49" charset="0"/>
+              </a:rPr>
+              <a:t> </a:t>
+            </a:r>
+            <a:r>
+              <a:rPr lang="en-US" dirty="0" err="1">
+                <a:solidFill>
+                  <a:prstClr val="black"/>
+                </a:solidFill>
+                <a:latin typeface="Lucida Console" panose="020B0609040504020204" pitchFamily="49" charset="0"/>
+              </a:rPr>
+              <a:t>THREE.PerspectiveCamera</a:t>
+            </a:r>
+            <a:r>
+              <a:rPr lang="en-US" dirty="0">
+                <a:solidFill>
+                  <a:prstClr val="black"/>
+                </a:solidFill>
+                <a:latin typeface="Lucida Console" panose="020B0609040504020204" pitchFamily="49" charset="0"/>
+              </a:rPr>
+              <a:t>(45, </a:t>
+            </a:r>
+            <a:r>
+              <a:rPr lang="en-US" dirty="0">
+                <a:solidFill>
+                  <a:srgbClr val="00BFBF"/>
+                </a:solidFill>
+                <a:latin typeface="Lucida Console" panose="020B0609040504020204" pitchFamily="49" charset="0"/>
+              </a:rPr>
+              <a:t>//wideness of the field of view</a:t>
+            </a:r>
+          </a:p>
+          <a:p>
+            <a:r>
+              <a:rPr lang="en-US" dirty="0">
+                <a:solidFill>
+                  <a:prstClr val="black"/>
+                </a:solidFill>
+                <a:latin typeface="Lucida Console" panose="020B0609040504020204" pitchFamily="49" charset="0"/>
+              </a:rPr>
+              <a:t>                                                  </a:t>
+            </a:r>
+            <a:r>
+              <a:rPr lang="en-US" dirty="0">
+                <a:solidFill>
+                  <a:srgbClr val="00BFBF"/>
+                </a:solidFill>
+                <a:latin typeface="Lucida Console" panose="020B0609040504020204" pitchFamily="49" charset="0"/>
+              </a:rPr>
+              <a:t>this</a:t>
+            </a:r>
+            <a:r>
+              <a:rPr lang="en-US" dirty="0">
+                <a:solidFill>
+                  <a:prstClr val="black"/>
+                </a:solidFill>
+                <a:latin typeface="Lucida Console" panose="020B0609040504020204" pitchFamily="49" charset="0"/>
+              </a:rPr>
+              <a:t>.$(</a:t>
+            </a:r>
+            <a:r>
+              <a:rPr lang="en-US" dirty="0">
+                <a:solidFill>
+                  <a:srgbClr val="BFBF00"/>
+                </a:solidFill>
+                <a:latin typeface="Lucida Console" panose="020B0609040504020204" pitchFamily="49" charset="0"/>
+              </a:rPr>
+              <a:t>'#</a:t>
+            </a:r>
+            <a:r>
+              <a:rPr lang="en-US" dirty="0" err="1">
+                <a:solidFill>
+                  <a:srgbClr val="BFBF00"/>
+                </a:solidFill>
+                <a:latin typeface="Lucida Console" panose="020B0609040504020204" pitchFamily="49" charset="0"/>
+              </a:rPr>
+              <a:t>maincanvas</a:t>
+            </a:r>
+            <a:r>
+              <a:rPr lang="en-US" dirty="0">
+                <a:solidFill>
+                  <a:srgbClr val="BFBF00"/>
+                </a:solidFill>
+                <a:latin typeface="Lucida Console" panose="020B0609040504020204" pitchFamily="49" charset="0"/>
+              </a:rPr>
+              <a:t>'</a:t>
+            </a:r>
+            <a:r>
+              <a:rPr lang="en-US" dirty="0">
+                <a:solidFill>
+                  <a:prstClr val="black"/>
+                </a:solidFill>
+                <a:latin typeface="Lucida Console" panose="020B0609040504020204" pitchFamily="49" charset="0"/>
+              </a:rPr>
+              <a:t>).width() / </a:t>
+            </a:r>
+            <a:r>
+              <a:rPr lang="en-US" dirty="0">
+                <a:solidFill>
+                  <a:srgbClr val="00BFBF"/>
+                </a:solidFill>
+                <a:latin typeface="Lucida Console" panose="020B0609040504020204" pitchFamily="49" charset="0"/>
+              </a:rPr>
+              <a:t>this</a:t>
+            </a:r>
+            <a:r>
+              <a:rPr lang="en-US" dirty="0">
+                <a:solidFill>
+                  <a:prstClr val="black"/>
+                </a:solidFill>
+                <a:latin typeface="Lucida Console" panose="020B0609040504020204" pitchFamily="49" charset="0"/>
+              </a:rPr>
+              <a:t>.$(</a:t>
+            </a:r>
+            <a:r>
+              <a:rPr lang="en-US" dirty="0">
+                <a:solidFill>
+                  <a:srgbClr val="BFBF00"/>
+                </a:solidFill>
+                <a:latin typeface="Lucida Console" panose="020B0609040504020204" pitchFamily="49" charset="0"/>
+              </a:rPr>
+              <a:t>'#</a:t>
+            </a:r>
+            <a:r>
+              <a:rPr lang="en-US" dirty="0" err="1">
+                <a:solidFill>
+                  <a:srgbClr val="BFBF00"/>
+                </a:solidFill>
+                <a:latin typeface="Lucida Console" panose="020B0609040504020204" pitchFamily="49" charset="0"/>
+              </a:rPr>
+              <a:t>maincanvas</a:t>
+            </a:r>
+            <a:r>
+              <a:rPr lang="en-US" dirty="0">
+                <a:solidFill>
+                  <a:srgbClr val="BFBF00"/>
+                </a:solidFill>
+                <a:latin typeface="Lucida Console" panose="020B0609040504020204" pitchFamily="49" charset="0"/>
+              </a:rPr>
+              <a:t>'</a:t>
+            </a:r>
+            <a:r>
+              <a:rPr lang="en-US" dirty="0">
+                <a:solidFill>
+                  <a:prstClr val="black"/>
+                </a:solidFill>
+                <a:latin typeface="Lucida Console" panose="020B0609040504020204" pitchFamily="49" charset="0"/>
+              </a:rPr>
+              <a:t>).height(), </a:t>
+            </a:r>
+            <a:r>
+              <a:rPr lang="en-US" dirty="0">
+                <a:solidFill>
+                  <a:srgbClr val="00BFBF"/>
+                </a:solidFill>
+                <a:latin typeface="Lucida Console" panose="020B0609040504020204" pitchFamily="49" charset="0"/>
+              </a:rPr>
+              <a:t>//aspect ratio</a:t>
+            </a:r>
+          </a:p>
+          <a:p>
+            <a:r>
+              <a:rPr lang="en-US" dirty="0">
+                <a:solidFill>
+                  <a:prstClr val="black"/>
+                </a:solidFill>
+                <a:latin typeface="Lucida Console" panose="020B0609040504020204" pitchFamily="49" charset="0"/>
+              </a:rPr>
+              <a:t>                                                  .1, </a:t>
+            </a:r>
+            <a:r>
+              <a:rPr lang="en-US" dirty="0">
+                <a:solidFill>
+                  <a:srgbClr val="00BFBF"/>
+                </a:solidFill>
+                <a:latin typeface="Lucida Console" panose="020B0609040504020204" pitchFamily="49" charset="0"/>
+              </a:rPr>
+              <a:t>//near</a:t>
+            </a:r>
+          </a:p>
+          <a:p>
+            <a:r>
+              <a:rPr lang="en-US" dirty="0">
+                <a:solidFill>
+                  <a:prstClr val="black"/>
+                </a:solidFill>
+                <a:latin typeface="Lucida Console" panose="020B0609040504020204" pitchFamily="49" charset="0"/>
+              </a:rPr>
+              <a:t>                                                  3000);  </a:t>
+            </a:r>
+            <a:r>
+              <a:rPr lang="en-US" dirty="0">
+                <a:solidFill>
+                  <a:srgbClr val="00BFBF"/>
+                </a:solidFill>
+                <a:latin typeface="Lucida Console" panose="020B0609040504020204" pitchFamily="49" charset="0"/>
+              </a:rPr>
+              <a:t>//far</a:t>
+            </a:r>
+          </a:p>
+          <a:p>
+            <a:r>
+              <a:rPr lang="en-US" dirty="0" err="1" smtClean="0">
+                <a:solidFill>
+                  <a:srgbClr val="00BFBF"/>
+                </a:solidFill>
+                <a:latin typeface="Lucida Console" panose="020B0609040504020204" pitchFamily="49" charset="0"/>
+              </a:rPr>
+              <a:t>this</a:t>
+            </a:r>
+            <a:r>
+              <a:rPr lang="en-US" dirty="0" err="1" smtClean="0">
+                <a:solidFill>
+                  <a:prstClr val="black"/>
+                </a:solidFill>
+                <a:latin typeface="Lucida Console" panose="020B0609040504020204" pitchFamily="49" charset="0"/>
+              </a:rPr>
+              <a:t>.camera.position.y</a:t>
+            </a:r>
+            <a:r>
+              <a:rPr lang="en-US" dirty="0" smtClean="0">
+                <a:solidFill>
+                  <a:prstClr val="black"/>
+                </a:solidFill>
+                <a:latin typeface="Lucida Console" panose="020B0609040504020204" pitchFamily="49" charset="0"/>
+              </a:rPr>
+              <a:t> </a:t>
+            </a:r>
+            <a:r>
+              <a:rPr lang="en-US" dirty="0">
+                <a:solidFill>
+                  <a:prstClr val="black"/>
+                </a:solidFill>
+                <a:latin typeface="Lucida Console" panose="020B0609040504020204" pitchFamily="49" charset="0"/>
+              </a:rPr>
+              <a:t>= 110;</a:t>
+            </a:r>
+          </a:p>
+          <a:p>
+            <a:r>
+              <a:rPr lang="en-US" dirty="0" err="1" smtClean="0">
+                <a:solidFill>
+                  <a:srgbClr val="00BFBF"/>
+                </a:solidFill>
+                <a:latin typeface="Lucida Console" panose="020B0609040504020204" pitchFamily="49" charset="0"/>
+              </a:rPr>
+              <a:t>this</a:t>
+            </a:r>
+            <a:r>
+              <a:rPr lang="en-US" dirty="0" err="1" smtClean="0">
+                <a:solidFill>
+                  <a:prstClr val="black"/>
+                </a:solidFill>
+                <a:latin typeface="Lucida Console" panose="020B0609040504020204" pitchFamily="49" charset="0"/>
+              </a:rPr>
+              <a:t>.camera.position.z</a:t>
+            </a:r>
+            <a:r>
+              <a:rPr lang="en-US" dirty="0" smtClean="0">
+                <a:solidFill>
+                  <a:prstClr val="black"/>
+                </a:solidFill>
+                <a:latin typeface="Lucida Console" panose="020B0609040504020204" pitchFamily="49" charset="0"/>
+              </a:rPr>
+              <a:t> </a:t>
+            </a:r>
+            <a:r>
+              <a:rPr lang="en-US" dirty="0">
+                <a:solidFill>
+                  <a:prstClr val="black"/>
+                </a:solidFill>
+                <a:latin typeface="Lucida Console" panose="020B0609040504020204" pitchFamily="49" charset="0"/>
+              </a:rPr>
+              <a:t>= 600;</a:t>
+            </a:r>
+            <a:endParaRPr lang="en-US" dirty="0"/>
+          </a:p>
+        </p:txBody>
+      </p:sp>
+    </p:spTree>
+    <p:extLst>
+      <p:ext uri="{BB962C8B-B14F-4D97-AF65-F5344CB8AC3E}">
+        <p14:creationId xmlns:p14="http://schemas.microsoft.com/office/powerpoint/2010/main" val="2526717490"/>
+      </p:ext>
+    </p:extLst>
+  </p:cSld>
+  <p:clrMapOvr>
+    <a:masterClrMapping/>
+  </p:clrMapOvr>
+</p:sld>
+</file>
+
+<file path=ppt/slides/slide12.xml><?xml version="1.0" encoding="utf-8"?>
+<p:sld xmlns:a="http://schemas.openxmlformats.org/drawingml/2006/main" xmlns:r="http://schemas.openxmlformats.org/officeDocument/2006/relationships" xmlns:p="http://schemas.openxmlformats.org/presentationml/2006/main">
+  <p:cSld>
+    <p:spTree>
+      <p:nvGrpSpPr>
+        <p:cNvPr id="1" name=""/>
+        <p:cNvGrpSpPr/>
+        <p:nvPr/>
+      </p:nvGrpSpPr>
+      <p:grpSpPr>
+        <a:xfrm>
+          <a:off x="0" y="0"/>
+          <a:ext cx="0" cy="0"/>
+          <a:chOff x="0" y="0"/>
+          <a:chExt cx="0" cy="0"/>
+        </a:xfrm>
+      </p:grpSpPr>
+      <p:sp>
+        <p:nvSpPr>
+          <p:cNvPr id="2" name="Title 1"/>
+          <p:cNvSpPr>
+            <a:spLocks noGrp="1"/>
+          </p:cNvSpPr>
+          <p:nvPr>
+            <p:ph type="title"/>
+          </p:nvPr>
+        </p:nvSpPr>
+        <p:spPr/>
+        <p:txBody>
+          <a:bodyPr/>
+          <a:lstStyle/>
+          <a:p>
+            <a:r>
+              <a:rPr lang="en-US" dirty="0" smtClean="0"/>
+              <a:t>Lighting</a:t>
+            </a:r>
+            <a:endParaRPr lang="en-US" dirty="0"/>
+          </a:p>
+        </p:txBody>
+      </p:sp>
+      <p:sp>
+        <p:nvSpPr>
+          <p:cNvPr id="3" name="Content Placeholder 2"/>
+          <p:cNvSpPr>
+            <a:spLocks noGrp="1"/>
+          </p:cNvSpPr>
+          <p:nvPr>
+            <p:ph idx="1"/>
+          </p:nvPr>
+        </p:nvSpPr>
+        <p:spPr/>
+        <p:txBody>
+          <a:bodyPr/>
+          <a:lstStyle/>
+          <a:p>
+            <a:r>
+              <a:rPr lang="en-US" dirty="0" err="1" smtClean="0">
+                <a:solidFill>
+                  <a:srgbClr val="00BFBF"/>
+                </a:solidFill>
+                <a:latin typeface="Lucida Console" panose="020B0609040504020204" pitchFamily="49" charset="0"/>
+              </a:rPr>
+              <a:t>var</a:t>
+            </a:r>
+            <a:r>
+              <a:rPr lang="en-US" dirty="0" smtClean="0">
+                <a:solidFill>
+                  <a:prstClr val="black"/>
+                </a:solidFill>
+                <a:latin typeface="Lucida Console" panose="020B0609040504020204" pitchFamily="49" charset="0"/>
+              </a:rPr>
+              <a:t> </a:t>
+            </a:r>
+            <a:r>
+              <a:rPr lang="en-US" dirty="0" err="1">
+                <a:solidFill>
+                  <a:prstClr val="black"/>
+                </a:solidFill>
+                <a:latin typeface="Lucida Console" panose="020B0609040504020204" pitchFamily="49" charset="0"/>
+              </a:rPr>
+              <a:t>ambientLight</a:t>
+            </a:r>
+            <a:r>
+              <a:rPr lang="en-US" dirty="0">
+                <a:solidFill>
+                  <a:prstClr val="black"/>
+                </a:solidFill>
+                <a:latin typeface="Lucida Console" panose="020B0609040504020204" pitchFamily="49" charset="0"/>
+              </a:rPr>
+              <a:t> = </a:t>
+            </a:r>
+            <a:r>
+              <a:rPr lang="en-US" dirty="0">
+                <a:solidFill>
+                  <a:srgbClr val="BFBF00"/>
+                </a:solidFill>
+                <a:latin typeface="Lucida Console" panose="020B0609040504020204" pitchFamily="49" charset="0"/>
+              </a:rPr>
+              <a:t>new</a:t>
+            </a:r>
+            <a:r>
+              <a:rPr lang="en-US" dirty="0">
+                <a:solidFill>
+                  <a:prstClr val="black"/>
+                </a:solidFill>
+                <a:latin typeface="Lucida Console" panose="020B0609040504020204" pitchFamily="49" charset="0"/>
+              </a:rPr>
+              <a:t> </a:t>
+            </a:r>
+            <a:r>
+              <a:rPr lang="en-US" dirty="0" err="1">
+                <a:solidFill>
+                  <a:prstClr val="black"/>
+                </a:solidFill>
+                <a:latin typeface="Lucida Console" panose="020B0609040504020204" pitchFamily="49" charset="0"/>
+              </a:rPr>
+              <a:t>THREE.AmbientLight</a:t>
+            </a:r>
+            <a:r>
+              <a:rPr lang="en-US" dirty="0">
+                <a:solidFill>
+                  <a:prstClr val="black"/>
+                </a:solidFill>
+                <a:latin typeface="Lucida Console" panose="020B0609040504020204" pitchFamily="49" charset="0"/>
+              </a:rPr>
+              <a:t>(</a:t>
+            </a:r>
+            <a:r>
+              <a:rPr lang="en-US" dirty="0">
+                <a:solidFill>
+                  <a:srgbClr val="BFBF00"/>
+                </a:solidFill>
+                <a:latin typeface="Lucida Console" panose="020B0609040504020204" pitchFamily="49" charset="0"/>
+              </a:rPr>
+              <a:t>new</a:t>
+            </a:r>
+            <a:r>
+              <a:rPr lang="en-US" dirty="0">
+                <a:solidFill>
+                  <a:prstClr val="black"/>
+                </a:solidFill>
+                <a:latin typeface="Lucida Console" panose="020B0609040504020204" pitchFamily="49" charset="0"/>
+              </a:rPr>
+              <a:t> </a:t>
+            </a:r>
+            <a:r>
+              <a:rPr lang="en-US" dirty="0" err="1">
+                <a:solidFill>
+                  <a:prstClr val="black"/>
+                </a:solidFill>
+                <a:latin typeface="Lucida Console" panose="020B0609040504020204" pitchFamily="49" charset="0"/>
+              </a:rPr>
+              <a:t>THREE.Color</a:t>
+            </a:r>
+            <a:r>
+              <a:rPr lang="en-US" dirty="0">
+                <a:solidFill>
+                  <a:prstClr val="black"/>
+                </a:solidFill>
+                <a:latin typeface="Lucida Console" panose="020B0609040504020204" pitchFamily="49" charset="0"/>
+              </a:rPr>
+              <a:t>(</a:t>
+            </a:r>
+            <a:r>
+              <a:rPr lang="en-US" dirty="0">
+                <a:solidFill>
+                  <a:srgbClr val="BFBF00"/>
+                </a:solidFill>
+                <a:latin typeface="Lucida Console" panose="020B0609040504020204" pitchFamily="49" charset="0"/>
+              </a:rPr>
+              <a:t>"#424242"</a:t>
+            </a:r>
+            <a:r>
+              <a:rPr lang="en-US" dirty="0">
+                <a:solidFill>
+                  <a:prstClr val="black"/>
+                </a:solidFill>
+                <a:latin typeface="Lucida Console" panose="020B0609040504020204" pitchFamily="49" charset="0"/>
+              </a:rPr>
+              <a:t>));</a:t>
+            </a:r>
+          </a:p>
+          <a:p>
+            <a:r>
+              <a:rPr lang="en-US" dirty="0" err="1" smtClean="0">
+                <a:solidFill>
+                  <a:srgbClr val="00BFBF"/>
+                </a:solidFill>
+                <a:latin typeface="Lucida Console" panose="020B0609040504020204" pitchFamily="49" charset="0"/>
+              </a:rPr>
+              <a:t>this</a:t>
+            </a:r>
+            <a:r>
+              <a:rPr lang="en-US" dirty="0" err="1" smtClean="0">
+                <a:solidFill>
+                  <a:prstClr val="black"/>
+                </a:solidFill>
+                <a:latin typeface="Lucida Console" panose="020B0609040504020204" pitchFamily="49" charset="0"/>
+              </a:rPr>
+              <a:t>.scene.add</a:t>
+            </a:r>
+            <a:r>
+              <a:rPr lang="en-US" dirty="0" smtClean="0">
+                <a:solidFill>
+                  <a:prstClr val="black"/>
+                </a:solidFill>
+                <a:latin typeface="Lucida Console" panose="020B0609040504020204" pitchFamily="49" charset="0"/>
+              </a:rPr>
+              <a:t>(</a:t>
+            </a:r>
+            <a:r>
+              <a:rPr lang="en-US" dirty="0" err="1" smtClean="0">
+                <a:solidFill>
+                  <a:prstClr val="black"/>
+                </a:solidFill>
+                <a:latin typeface="Lucida Console" panose="020B0609040504020204" pitchFamily="49" charset="0"/>
+              </a:rPr>
+              <a:t>ambientLight</a:t>
+            </a:r>
+            <a:r>
+              <a:rPr lang="en-US" dirty="0">
+                <a:solidFill>
+                  <a:prstClr val="black"/>
+                </a:solidFill>
+                <a:latin typeface="Lucida Console" panose="020B0609040504020204" pitchFamily="49" charset="0"/>
+              </a:rPr>
+              <a:t>);</a:t>
+            </a:r>
+          </a:p>
+          <a:p>
+            <a:endParaRPr lang="en-US" dirty="0">
+              <a:solidFill>
+                <a:prstClr val="black"/>
+              </a:solidFill>
+              <a:latin typeface="Lucida Console" panose="020B0609040504020204" pitchFamily="49" charset="0"/>
+            </a:endParaRPr>
+          </a:p>
+          <a:p>
+            <a:r>
+              <a:rPr lang="en-US" dirty="0" err="1" smtClean="0">
+                <a:solidFill>
+                  <a:srgbClr val="00BFBF"/>
+                </a:solidFill>
+                <a:latin typeface="Lucida Console" panose="020B0609040504020204" pitchFamily="49" charset="0"/>
+              </a:rPr>
+              <a:t>var</a:t>
+            </a:r>
+            <a:r>
+              <a:rPr lang="en-US" dirty="0" smtClean="0">
+                <a:solidFill>
+                  <a:prstClr val="black"/>
+                </a:solidFill>
+                <a:latin typeface="Lucida Console" panose="020B0609040504020204" pitchFamily="49" charset="0"/>
+              </a:rPr>
+              <a:t> </a:t>
+            </a:r>
+            <a:r>
+              <a:rPr lang="en-US" dirty="0" err="1">
+                <a:solidFill>
+                  <a:prstClr val="black"/>
+                </a:solidFill>
+                <a:latin typeface="Lucida Console" panose="020B0609040504020204" pitchFamily="49" charset="0"/>
+              </a:rPr>
+              <a:t>directionalLight</a:t>
+            </a:r>
+            <a:r>
+              <a:rPr lang="en-US" dirty="0">
+                <a:solidFill>
+                  <a:prstClr val="black"/>
+                </a:solidFill>
+                <a:latin typeface="Lucida Console" panose="020B0609040504020204" pitchFamily="49" charset="0"/>
+              </a:rPr>
+              <a:t> = </a:t>
+            </a:r>
+            <a:r>
+              <a:rPr lang="en-US" dirty="0">
+                <a:solidFill>
+                  <a:srgbClr val="BFBF00"/>
+                </a:solidFill>
+                <a:latin typeface="Lucida Console" panose="020B0609040504020204" pitchFamily="49" charset="0"/>
+              </a:rPr>
+              <a:t>new</a:t>
+            </a:r>
+            <a:r>
+              <a:rPr lang="en-US" dirty="0">
+                <a:solidFill>
+                  <a:prstClr val="black"/>
+                </a:solidFill>
+                <a:latin typeface="Lucida Console" panose="020B0609040504020204" pitchFamily="49" charset="0"/>
+              </a:rPr>
+              <a:t> </a:t>
+            </a:r>
+            <a:r>
+              <a:rPr lang="en-US" dirty="0" err="1">
+                <a:solidFill>
+                  <a:prstClr val="black"/>
+                </a:solidFill>
+                <a:latin typeface="Lucida Console" panose="020B0609040504020204" pitchFamily="49" charset="0"/>
+              </a:rPr>
+              <a:t>THREE.DirectionalLight</a:t>
+            </a:r>
+            <a:r>
+              <a:rPr lang="en-US" dirty="0">
+                <a:solidFill>
+                  <a:prstClr val="black"/>
+                </a:solidFill>
+                <a:latin typeface="Lucida Console" panose="020B0609040504020204" pitchFamily="49" charset="0"/>
+              </a:rPr>
+              <a:t>(0xffffff);</a:t>
+            </a:r>
+          </a:p>
+          <a:p>
+            <a:r>
+              <a:rPr lang="en-US" dirty="0" err="1" smtClean="0">
+                <a:solidFill>
+                  <a:prstClr val="black"/>
+                </a:solidFill>
+                <a:latin typeface="Lucida Console" panose="020B0609040504020204" pitchFamily="49" charset="0"/>
+              </a:rPr>
+              <a:t>directionalLight.position.set</a:t>
+            </a:r>
+            <a:r>
+              <a:rPr lang="en-US" dirty="0" smtClean="0">
+                <a:solidFill>
+                  <a:prstClr val="black"/>
+                </a:solidFill>
+                <a:latin typeface="Lucida Console" panose="020B0609040504020204" pitchFamily="49" charset="0"/>
+              </a:rPr>
+              <a:t>(1</a:t>
+            </a:r>
+            <a:r>
+              <a:rPr lang="en-US" dirty="0">
+                <a:solidFill>
+                  <a:prstClr val="black"/>
+                </a:solidFill>
+                <a:latin typeface="Lucida Console" panose="020B0609040504020204" pitchFamily="49" charset="0"/>
+              </a:rPr>
+              <a:t>, 1, 1).normalize();</a:t>
+            </a:r>
+          </a:p>
+          <a:p>
+            <a:r>
+              <a:rPr lang="en-US" dirty="0" err="1" smtClean="0">
+                <a:solidFill>
+                  <a:srgbClr val="00BFBF"/>
+                </a:solidFill>
+                <a:latin typeface="Lucida Console" panose="020B0609040504020204" pitchFamily="49" charset="0"/>
+              </a:rPr>
+              <a:t>this</a:t>
+            </a:r>
+            <a:r>
+              <a:rPr lang="en-US" dirty="0" err="1" smtClean="0">
+                <a:solidFill>
+                  <a:prstClr val="black"/>
+                </a:solidFill>
+                <a:latin typeface="Lucida Console" panose="020B0609040504020204" pitchFamily="49" charset="0"/>
+              </a:rPr>
+              <a:t>.scene.add</a:t>
+            </a:r>
+            <a:r>
+              <a:rPr lang="en-US" dirty="0" smtClean="0">
+                <a:solidFill>
+                  <a:prstClr val="black"/>
+                </a:solidFill>
+                <a:latin typeface="Lucida Console" panose="020B0609040504020204" pitchFamily="49" charset="0"/>
+              </a:rPr>
+              <a:t>(</a:t>
+            </a:r>
+            <a:r>
+              <a:rPr lang="en-US" dirty="0" err="1" smtClean="0">
+                <a:solidFill>
+                  <a:prstClr val="black"/>
+                </a:solidFill>
+                <a:latin typeface="Lucida Console" panose="020B0609040504020204" pitchFamily="49" charset="0"/>
+              </a:rPr>
+              <a:t>directionalLight</a:t>
+            </a:r>
+            <a:r>
+              <a:rPr lang="en-US" dirty="0">
+                <a:solidFill>
+                  <a:prstClr val="black"/>
+                </a:solidFill>
+                <a:latin typeface="Lucida Console" panose="020B0609040504020204" pitchFamily="49" charset="0"/>
+              </a:rPr>
+              <a:t>);</a:t>
+            </a:r>
+            <a:endParaRPr lang="en-US" dirty="0"/>
+          </a:p>
+        </p:txBody>
+      </p:sp>
+    </p:spTree>
+    <p:extLst>
+      <p:ext uri="{BB962C8B-B14F-4D97-AF65-F5344CB8AC3E}">
+        <p14:creationId xmlns:p14="http://schemas.microsoft.com/office/powerpoint/2010/main" val="1111756972"/>
+      </p:ext>
+    </p:extLst>
+  </p:cSld>
+  <p:clrMapOvr>
+    <a:masterClrMapping/>
+  </p:clrMapOvr>
+</p:sld>
+</file>
+
+<file path=ppt/slides/slide13.xml><?xml version="1.0" encoding="utf-8"?>
+<p:sld xmlns:a="http://schemas.openxmlformats.org/drawingml/2006/main" xmlns:r="http://schemas.openxmlformats.org/officeDocument/2006/relationships" xmlns:p="http://schemas.openxmlformats.org/presentationml/2006/main">
+  <p:cSld>
+    <p:spTree>
+      <p:nvGrpSpPr>
+        <p:cNvPr id="1" name=""/>
+        <p:cNvGrpSpPr/>
+        <p:nvPr/>
+      </p:nvGrpSpPr>
+      <p:grpSpPr>
+        <a:xfrm>
+          <a:off x="0" y="0"/>
+          <a:ext cx="0" cy="0"/>
+          <a:chOff x="0" y="0"/>
+          <a:chExt cx="0" cy="0"/>
+        </a:xfrm>
+      </p:grpSpPr>
+      <p:sp>
+        <p:nvSpPr>
+          <p:cNvPr id="2" name="Title 1"/>
+          <p:cNvSpPr>
+            <a:spLocks noGrp="1"/>
+          </p:cNvSpPr>
+          <p:nvPr>
+            <p:ph type="title"/>
+          </p:nvPr>
+        </p:nvSpPr>
+        <p:spPr/>
+        <p:txBody>
+          <a:bodyPr/>
+          <a:lstStyle/>
+          <a:p>
+            <a:r>
+              <a:rPr lang="en-US" dirty="0" smtClean="0"/>
+              <a:t>Geometries</a:t>
+            </a:r>
+            <a:endParaRPr lang="en-US" dirty="0"/>
+          </a:p>
+        </p:txBody>
+      </p:sp>
+      <p:sp>
+        <p:nvSpPr>
+          <p:cNvPr id="3" name="Content Placeholder 2"/>
+          <p:cNvSpPr>
+            <a:spLocks noGrp="1"/>
+          </p:cNvSpPr>
+          <p:nvPr>
+            <p:ph idx="1"/>
+          </p:nvPr>
+        </p:nvSpPr>
+        <p:spPr/>
+        <p:txBody>
+          <a:bodyPr>
+            <a:normAutofit fontScale="92500" lnSpcReduction="10000"/>
+          </a:bodyPr>
+          <a:lstStyle/>
+          <a:p>
+            <a:r>
+              <a:rPr lang="en-US" dirty="0">
+                <a:solidFill>
+                  <a:prstClr val="black"/>
+                </a:solidFill>
+                <a:latin typeface="Lucida Console" panose="020B0609040504020204" pitchFamily="49" charset="0"/>
+              </a:rPr>
+              <a:t> </a:t>
+            </a:r>
+            <a:r>
+              <a:rPr lang="en-US" dirty="0" err="1">
+                <a:solidFill>
+                  <a:srgbClr val="00BFBF"/>
+                </a:solidFill>
+                <a:latin typeface="Lucida Console" panose="020B0609040504020204" pitchFamily="49" charset="0"/>
+              </a:rPr>
+              <a:t>var</a:t>
+            </a:r>
+            <a:r>
+              <a:rPr lang="en-US" dirty="0">
+                <a:solidFill>
+                  <a:prstClr val="black"/>
+                </a:solidFill>
+                <a:latin typeface="Lucida Console" panose="020B0609040504020204" pitchFamily="49" charset="0"/>
+              </a:rPr>
+              <a:t> material = </a:t>
+            </a:r>
+            <a:r>
+              <a:rPr lang="en-US" dirty="0" err="1">
+                <a:solidFill>
+                  <a:prstClr val="black"/>
+                </a:solidFill>
+                <a:latin typeface="Lucida Console" panose="020B0609040504020204" pitchFamily="49" charset="0"/>
+              </a:rPr>
+              <a:t>Physijs.createMaterial</a:t>
+            </a:r>
+            <a:r>
+              <a:rPr lang="en-US" dirty="0">
+                <a:solidFill>
+                  <a:prstClr val="black"/>
+                </a:solidFill>
+                <a:latin typeface="Lucida Console" panose="020B0609040504020204" pitchFamily="49" charset="0"/>
+              </a:rPr>
+              <a:t>(</a:t>
+            </a:r>
+          </a:p>
+          <a:p>
+            <a:r>
+              <a:rPr lang="en-US" dirty="0">
+                <a:solidFill>
+                  <a:prstClr val="black"/>
+                </a:solidFill>
+                <a:latin typeface="Lucida Console" panose="020B0609040504020204" pitchFamily="49" charset="0"/>
+              </a:rPr>
+              <a:t>            </a:t>
+            </a:r>
+            <a:r>
+              <a:rPr lang="en-US" dirty="0">
+                <a:solidFill>
+                  <a:srgbClr val="BFBF00"/>
+                </a:solidFill>
+                <a:latin typeface="Lucida Console" panose="020B0609040504020204" pitchFamily="49" charset="0"/>
+              </a:rPr>
+              <a:t>new</a:t>
+            </a:r>
+            <a:r>
+              <a:rPr lang="en-US" dirty="0">
+                <a:solidFill>
+                  <a:prstClr val="black"/>
+                </a:solidFill>
+                <a:latin typeface="Lucida Console" panose="020B0609040504020204" pitchFamily="49" charset="0"/>
+              </a:rPr>
+              <a:t> </a:t>
+            </a:r>
+            <a:r>
+              <a:rPr lang="en-US" dirty="0" err="1">
+                <a:solidFill>
+                  <a:prstClr val="black"/>
+                </a:solidFill>
+                <a:latin typeface="Lucida Console" panose="020B0609040504020204" pitchFamily="49" charset="0"/>
+              </a:rPr>
+              <a:t>THREE.MeshLambertMaterial</a:t>
+            </a:r>
+            <a:r>
+              <a:rPr lang="en-US" dirty="0">
+                <a:solidFill>
+                  <a:prstClr val="black"/>
+                </a:solidFill>
+                <a:latin typeface="Lucida Console" panose="020B0609040504020204" pitchFamily="49" charset="0"/>
+              </a:rPr>
+              <a:t>({</a:t>
+            </a:r>
+          </a:p>
+          <a:p>
+            <a:r>
+              <a:rPr lang="en-US" dirty="0">
+                <a:solidFill>
+                  <a:prstClr val="black"/>
+                </a:solidFill>
+                <a:latin typeface="Lucida Console" panose="020B0609040504020204" pitchFamily="49" charset="0"/>
+              </a:rPr>
+              <a:t>                map: </a:t>
+            </a:r>
+            <a:r>
+              <a:rPr lang="en-US" dirty="0" err="1">
+                <a:solidFill>
+                  <a:prstClr val="black"/>
+                </a:solidFill>
+                <a:latin typeface="Lucida Console" panose="020B0609040504020204" pitchFamily="49" charset="0"/>
+              </a:rPr>
+              <a:t>THREE.ImageUtils.loadTexture</a:t>
+            </a:r>
+            <a:r>
+              <a:rPr lang="en-US" dirty="0">
+                <a:solidFill>
+                  <a:prstClr val="black"/>
+                </a:solidFill>
+                <a:latin typeface="Lucida Console" panose="020B0609040504020204" pitchFamily="49" charset="0"/>
+              </a:rPr>
+              <a:t>(</a:t>
+            </a:r>
+            <a:r>
+              <a:rPr lang="en-US" dirty="0">
+                <a:solidFill>
+                  <a:srgbClr val="BFBF00"/>
+                </a:solidFill>
+                <a:latin typeface="Lucida Console" panose="020B0609040504020204" pitchFamily="49" charset="0"/>
+              </a:rPr>
+              <a:t>'/static/crate.jpg'</a:t>
+            </a:r>
+            <a:r>
+              <a:rPr lang="en-US" dirty="0">
+                <a:solidFill>
+                  <a:prstClr val="black"/>
+                </a:solidFill>
+                <a:latin typeface="Lucida Console" panose="020B0609040504020204" pitchFamily="49" charset="0"/>
+              </a:rPr>
+              <a:t>, {}, </a:t>
+            </a:r>
+            <a:r>
+              <a:rPr lang="en-US" dirty="0">
+                <a:solidFill>
+                  <a:srgbClr val="00BFBF"/>
+                </a:solidFill>
+                <a:latin typeface="Lucida Console" panose="020B0609040504020204" pitchFamily="49" charset="0"/>
+              </a:rPr>
+              <a:t>function</a:t>
+            </a:r>
+            <a:r>
+              <a:rPr lang="en-US" dirty="0">
+                <a:solidFill>
+                  <a:prstClr val="black"/>
+                </a:solidFill>
+                <a:latin typeface="Lucida Console" panose="020B0609040504020204" pitchFamily="49" charset="0"/>
+              </a:rPr>
+              <a:t>() {</a:t>
+            </a:r>
+          </a:p>
+          <a:p>
+            <a:r>
+              <a:rPr lang="en-US" dirty="0">
+                <a:solidFill>
+                  <a:prstClr val="black"/>
+                </a:solidFill>
+                <a:latin typeface="Lucida Console" panose="020B0609040504020204" pitchFamily="49" charset="0"/>
+              </a:rPr>
+              <a:t>                    </a:t>
+            </a:r>
+            <a:r>
+              <a:rPr lang="en-US" dirty="0" err="1">
+                <a:solidFill>
+                  <a:srgbClr val="BFBF00"/>
+                </a:solidFill>
+                <a:latin typeface="Lucida Console" panose="020B0609040504020204" pitchFamily="49" charset="0"/>
+              </a:rPr>
+              <a:t>self</a:t>
+            </a:r>
+            <a:r>
+              <a:rPr lang="en-US" dirty="0" err="1">
+                <a:solidFill>
+                  <a:prstClr val="black"/>
+                </a:solidFill>
+                <a:latin typeface="Lucida Console" panose="020B0609040504020204" pitchFamily="49" charset="0"/>
+              </a:rPr>
+              <a:t>.render</a:t>
+            </a:r>
+            <a:r>
+              <a:rPr lang="en-US" dirty="0">
+                <a:solidFill>
+                  <a:prstClr val="black"/>
+                </a:solidFill>
+                <a:latin typeface="Lucida Console" panose="020B0609040504020204" pitchFamily="49" charset="0"/>
+              </a:rPr>
+              <a:t>();</a:t>
+            </a:r>
+          </a:p>
+          <a:p>
+            <a:r>
+              <a:rPr lang="en-US" dirty="0">
+                <a:solidFill>
+                  <a:prstClr val="black"/>
+                </a:solidFill>
+                <a:latin typeface="Lucida Console" panose="020B0609040504020204" pitchFamily="49" charset="0"/>
+              </a:rPr>
+              <a:t>                })</a:t>
+            </a:r>
+          </a:p>
+          <a:p>
+            <a:r>
+              <a:rPr lang="en-US" dirty="0">
+                <a:solidFill>
+                  <a:prstClr val="black"/>
+                </a:solidFill>
+                <a:latin typeface="Lucida Console" panose="020B0609040504020204" pitchFamily="49" charset="0"/>
+              </a:rPr>
+              <a:t>            }),</a:t>
+            </a:r>
+          </a:p>
+          <a:p>
+            <a:r>
+              <a:rPr lang="en-US" dirty="0">
+                <a:solidFill>
+                  <a:prstClr val="black"/>
+                </a:solidFill>
+                <a:latin typeface="Lucida Console" panose="020B0609040504020204" pitchFamily="49" charset="0"/>
+              </a:rPr>
+              <a:t>            .8, </a:t>
+            </a:r>
+            <a:r>
+              <a:rPr lang="en-US" dirty="0">
+                <a:solidFill>
+                  <a:srgbClr val="00BFBF"/>
+                </a:solidFill>
+                <a:latin typeface="Lucida Console" panose="020B0609040504020204" pitchFamily="49" charset="0"/>
+              </a:rPr>
+              <a:t>//friction</a:t>
+            </a:r>
+          </a:p>
+          <a:p>
+            <a:r>
+              <a:rPr lang="en-US" dirty="0">
+                <a:solidFill>
+                  <a:prstClr val="black"/>
+                </a:solidFill>
+                <a:latin typeface="Lucida Console" panose="020B0609040504020204" pitchFamily="49" charset="0"/>
+              </a:rPr>
+              <a:t>            .2  </a:t>
+            </a:r>
+            <a:r>
+              <a:rPr lang="en-US" dirty="0">
+                <a:solidFill>
+                  <a:srgbClr val="00BFBF"/>
+                </a:solidFill>
+                <a:latin typeface="Lucida Console" panose="020B0609040504020204" pitchFamily="49" charset="0"/>
+              </a:rPr>
+              <a:t>//restitution (</a:t>
+            </a:r>
+            <a:r>
+              <a:rPr lang="en-US" dirty="0" err="1">
+                <a:solidFill>
+                  <a:srgbClr val="00BFBF"/>
+                </a:solidFill>
+                <a:latin typeface="Lucida Console" panose="020B0609040504020204" pitchFamily="49" charset="0"/>
+              </a:rPr>
+              <a:t>bouncyness</a:t>
+            </a:r>
+            <a:r>
+              <a:rPr lang="en-US" dirty="0">
+                <a:solidFill>
+                  <a:srgbClr val="00BFBF"/>
+                </a:solidFill>
+                <a:latin typeface="Lucida Console" panose="020B0609040504020204" pitchFamily="49" charset="0"/>
+              </a:rPr>
+              <a:t>)</a:t>
+            </a:r>
+          </a:p>
+          <a:p>
+            <a:r>
+              <a:rPr lang="en-US" dirty="0">
+                <a:solidFill>
+                  <a:prstClr val="black"/>
+                </a:solidFill>
+                <a:latin typeface="Lucida Console" panose="020B0609040504020204" pitchFamily="49" charset="0"/>
+              </a:rPr>
+              <a:t>        </a:t>
+            </a:r>
+            <a:r>
+              <a:rPr lang="en-US" dirty="0" smtClean="0">
+                <a:solidFill>
+                  <a:prstClr val="black"/>
+                </a:solidFill>
+                <a:latin typeface="Lucida Console" panose="020B0609040504020204" pitchFamily="49" charset="0"/>
+              </a:rPr>
+              <a:t>);</a:t>
+            </a:r>
+            <a:endParaRPr lang="en-US" dirty="0">
+              <a:solidFill>
+                <a:prstClr val="black"/>
+              </a:solidFill>
+              <a:latin typeface="Lucida Console" panose="020B0609040504020204" pitchFamily="49" charset="0"/>
+            </a:endParaRPr>
+          </a:p>
+        </p:txBody>
+      </p:sp>
+    </p:spTree>
+    <p:extLst>
+      <p:ext uri="{BB962C8B-B14F-4D97-AF65-F5344CB8AC3E}">
+        <p14:creationId xmlns:p14="http://schemas.microsoft.com/office/powerpoint/2010/main" val="2877052804"/>
+      </p:ext>
+    </p:extLst>
+  </p:cSld>
+  <p:clrMapOvr>
+    <a:masterClrMapping/>
+  </p:clrMapOvr>
+</p:sld>
+</file>
+
+<file path=ppt/slides/slide14.xml><?xml version="1.0" encoding="utf-8"?>
+<p:sld xmlns:a="http://schemas.openxmlformats.org/drawingml/2006/main" xmlns:r="http://schemas.openxmlformats.org/officeDocument/2006/relationships" xmlns:p="http://schemas.openxmlformats.org/presentationml/2006/main">
+  <p:cSld>
+    <p:spTree>
+      <p:nvGrpSpPr>
+        <p:cNvPr id="1" name=""/>
+        <p:cNvGrpSpPr/>
+        <p:nvPr/>
+      </p:nvGrpSpPr>
+      <p:grpSpPr>
+        <a:xfrm>
+          <a:off x="0" y="0"/>
+          <a:ext cx="0" cy="0"/>
+          <a:chOff x="0" y="0"/>
+          <a:chExt cx="0" cy="0"/>
+        </a:xfrm>
+      </p:grpSpPr>
+      <p:sp>
+        <p:nvSpPr>
+          <p:cNvPr id="2" name="Title 1"/>
+          <p:cNvSpPr>
+            <a:spLocks noGrp="1"/>
+          </p:cNvSpPr>
+          <p:nvPr>
+            <p:ph type="title"/>
+          </p:nvPr>
+        </p:nvSpPr>
+        <p:spPr/>
+        <p:txBody>
+          <a:bodyPr/>
+          <a:lstStyle/>
+          <a:p>
+            <a:r>
+              <a:rPr lang="en-US" dirty="0" smtClean="0"/>
+              <a:t>Continued…</a:t>
+            </a:r>
+            <a:endParaRPr lang="en-US" dirty="0"/>
+          </a:p>
+        </p:txBody>
+      </p:sp>
+      <p:sp>
+        <p:nvSpPr>
+          <p:cNvPr id="3" name="Content Placeholder 2"/>
+          <p:cNvSpPr>
+            <a:spLocks noGrp="1"/>
+          </p:cNvSpPr>
+          <p:nvPr>
+            <p:ph idx="1"/>
+          </p:nvPr>
+        </p:nvSpPr>
+        <p:spPr/>
+        <p:txBody>
+          <a:bodyPr>
+            <a:normAutofit fontScale="92500" lnSpcReduction="20000"/>
+          </a:bodyPr>
+          <a:lstStyle/>
+          <a:p>
+            <a:endParaRPr lang="en-US" dirty="0" smtClean="0">
+              <a:solidFill>
+                <a:prstClr val="black"/>
+              </a:solidFill>
+              <a:latin typeface="Lucida Console" panose="020B0609040504020204" pitchFamily="49" charset="0"/>
+            </a:endParaRPr>
+          </a:p>
+          <a:p>
+            <a:pPr marL="0" indent="0">
+              <a:buNone/>
+            </a:pPr>
+            <a:r>
+              <a:rPr lang="en-US" dirty="0" smtClean="0">
+                <a:solidFill>
+                  <a:srgbClr val="00BFBF"/>
+                </a:solidFill>
+                <a:latin typeface="Lucida Console" panose="020B0609040504020204" pitchFamily="49" charset="0"/>
+              </a:rPr>
+              <a:t> </a:t>
+            </a:r>
+            <a:r>
+              <a:rPr lang="en-US" dirty="0" err="1" smtClean="0">
+                <a:solidFill>
+                  <a:srgbClr val="00BFBF"/>
+                </a:solidFill>
+                <a:latin typeface="Lucida Console" panose="020B0609040504020204" pitchFamily="49" charset="0"/>
+              </a:rPr>
+              <a:t>var</a:t>
+            </a:r>
+            <a:r>
+              <a:rPr lang="en-US" dirty="0" smtClean="0">
+                <a:solidFill>
+                  <a:prstClr val="black"/>
+                </a:solidFill>
+                <a:latin typeface="Lucida Console" panose="020B0609040504020204" pitchFamily="49" charset="0"/>
+              </a:rPr>
+              <a:t> </a:t>
+            </a:r>
+            <a:r>
+              <a:rPr lang="en-US" dirty="0">
+                <a:solidFill>
+                  <a:prstClr val="black"/>
+                </a:solidFill>
+                <a:latin typeface="Lucida Console" panose="020B0609040504020204" pitchFamily="49" charset="0"/>
+              </a:rPr>
+              <a:t>crate = </a:t>
+            </a:r>
+            <a:r>
+              <a:rPr lang="en-US" dirty="0">
+                <a:solidFill>
+                  <a:srgbClr val="BFBF00"/>
+                </a:solidFill>
+                <a:latin typeface="Lucida Console" panose="020B0609040504020204" pitchFamily="49" charset="0"/>
+              </a:rPr>
+              <a:t>new</a:t>
+            </a:r>
+            <a:r>
+              <a:rPr lang="en-US" dirty="0">
+                <a:solidFill>
+                  <a:prstClr val="black"/>
+                </a:solidFill>
+                <a:latin typeface="Lucida Console" panose="020B0609040504020204" pitchFamily="49" charset="0"/>
+              </a:rPr>
+              <a:t> </a:t>
+            </a:r>
+            <a:r>
+              <a:rPr lang="en-US" dirty="0" err="1">
+                <a:solidFill>
+                  <a:prstClr val="black"/>
+                </a:solidFill>
+                <a:latin typeface="Lucida Console" panose="020B0609040504020204" pitchFamily="49" charset="0"/>
+              </a:rPr>
+              <a:t>Physijs.BoxMesh</a:t>
+            </a:r>
+            <a:r>
+              <a:rPr lang="en-US" dirty="0">
+                <a:solidFill>
+                  <a:prstClr val="black"/>
+                </a:solidFill>
+                <a:latin typeface="Lucida Console" panose="020B0609040504020204" pitchFamily="49" charset="0"/>
+              </a:rPr>
+              <a:t>(</a:t>
+            </a:r>
+            <a:r>
+              <a:rPr lang="en-US" dirty="0">
+                <a:solidFill>
+                  <a:srgbClr val="BFBF00"/>
+                </a:solidFill>
+                <a:latin typeface="Lucida Console" panose="020B0609040504020204" pitchFamily="49" charset="0"/>
+              </a:rPr>
+              <a:t>new</a:t>
+            </a:r>
+            <a:r>
+              <a:rPr lang="en-US" dirty="0">
+                <a:solidFill>
+                  <a:prstClr val="black"/>
+                </a:solidFill>
+                <a:latin typeface="Lucida Console" panose="020B0609040504020204" pitchFamily="49" charset="0"/>
+              </a:rPr>
+              <a:t> </a:t>
+            </a:r>
+            <a:r>
+              <a:rPr lang="en-US" dirty="0" err="1">
+                <a:solidFill>
+                  <a:prstClr val="black"/>
+                </a:solidFill>
+                <a:latin typeface="Lucida Console" panose="020B0609040504020204" pitchFamily="49" charset="0"/>
+              </a:rPr>
+              <a:t>THREE.CubeGeometry</a:t>
+            </a:r>
+            <a:r>
+              <a:rPr lang="en-US" dirty="0">
+                <a:solidFill>
+                  <a:prstClr val="black"/>
+                </a:solidFill>
+                <a:latin typeface="Lucida Console" panose="020B0609040504020204" pitchFamily="49" charset="0"/>
+              </a:rPr>
+              <a:t>(30, 30, 30), material, 100);</a:t>
+            </a:r>
+          </a:p>
+          <a:p>
+            <a:r>
+              <a:rPr lang="en-US" dirty="0" smtClean="0">
+                <a:solidFill>
+                  <a:prstClr val="black"/>
+                </a:solidFill>
+                <a:latin typeface="Lucida Console" panose="020B0609040504020204" pitchFamily="49" charset="0"/>
+              </a:rPr>
+              <a:t>crate.name </a:t>
+            </a:r>
+            <a:r>
+              <a:rPr lang="en-US" dirty="0">
+                <a:solidFill>
+                  <a:prstClr val="black"/>
+                </a:solidFill>
+                <a:latin typeface="Lucida Console" panose="020B0609040504020204" pitchFamily="49" charset="0"/>
+              </a:rPr>
+              <a:t>= </a:t>
+            </a:r>
+            <a:r>
+              <a:rPr lang="en-US" dirty="0">
+                <a:solidFill>
+                  <a:srgbClr val="BFBF00"/>
+                </a:solidFill>
+                <a:latin typeface="Lucida Console" panose="020B0609040504020204" pitchFamily="49" charset="0"/>
+              </a:rPr>
+              <a:t>"crate"</a:t>
+            </a:r>
+            <a:r>
+              <a:rPr lang="en-US" dirty="0">
+                <a:solidFill>
+                  <a:prstClr val="black"/>
+                </a:solidFill>
+                <a:latin typeface="Lucida Console" panose="020B0609040504020204" pitchFamily="49" charset="0"/>
+              </a:rPr>
+              <a:t>;</a:t>
+            </a:r>
+          </a:p>
+          <a:p>
+            <a:r>
+              <a:rPr lang="en-US" dirty="0" err="1" smtClean="0">
+                <a:solidFill>
+                  <a:prstClr val="black"/>
+                </a:solidFill>
+                <a:latin typeface="Lucida Console" panose="020B0609040504020204" pitchFamily="49" charset="0"/>
+              </a:rPr>
+              <a:t>crate.castShadow</a:t>
+            </a:r>
+            <a:r>
+              <a:rPr lang="en-US" dirty="0" smtClean="0">
+                <a:solidFill>
+                  <a:prstClr val="black"/>
+                </a:solidFill>
+                <a:latin typeface="Lucida Console" panose="020B0609040504020204" pitchFamily="49" charset="0"/>
+              </a:rPr>
+              <a:t> </a:t>
+            </a:r>
+            <a:r>
+              <a:rPr lang="en-US" dirty="0">
+                <a:solidFill>
+                  <a:prstClr val="black"/>
+                </a:solidFill>
+                <a:latin typeface="Lucida Console" panose="020B0609040504020204" pitchFamily="49" charset="0"/>
+              </a:rPr>
+              <a:t>= </a:t>
+            </a:r>
+            <a:r>
+              <a:rPr lang="en-US" dirty="0">
+                <a:solidFill>
+                  <a:srgbClr val="BFBF00"/>
+                </a:solidFill>
+                <a:latin typeface="Lucida Console" panose="020B0609040504020204" pitchFamily="49" charset="0"/>
+              </a:rPr>
+              <a:t>true</a:t>
+            </a:r>
+            <a:r>
+              <a:rPr lang="en-US" dirty="0">
+                <a:solidFill>
+                  <a:prstClr val="black"/>
+                </a:solidFill>
+                <a:latin typeface="Lucida Console" panose="020B0609040504020204" pitchFamily="49" charset="0"/>
+              </a:rPr>
+              <a:t>;</a:t>
+            </a:r>
+          </a:p>
+          <a:p>
+            <a:r>
+              <a:rPr lang="en-US" dirty="0" err="1" smtClean="0">
+                <a:solidFill>
+                  <a:prstClr val="black"/>
+                </a:solidFill>
+                <a:latin typeface="Lucida Console" panose="020B0609040504020204" pitchFamily="49" charset="0"/>
+              </a:rPr>
+              <a:t>crate.receiveShadow</a:t>
+            </a:r>
+            <a:r>
+              <a:rPr lang="en-US" dirty="0" smtClean="0">
+                <a:solidFill>
+                  <a:prstClr val="black"/>
+                </a:solidFill>
+                <a:latin typeface="Lucida Console" panose="020B0609040504020204" pitchFamily="49" charset="0"/>
+              </a:rPr>
+              <a:t> </a:t>
+            </a:r>
+            <a:r>
+              <a:rPr lang="en-US" dirty="0">
+                <a:solidFill>
+                  <a:prstClr val="black"/>
+                </a:solidFill>
+                <a:latin typeface="Lucida Console" panose="020B0609040504020204" pitchFamily="49" charset="0"/>
+              </a:rPr>
+              <a:t>= </a:t>
+            </a:r>
+            <a:r>
+              <a:rPr lang="en-US" dirty="0">
+                <a:solidFill>
+                  <a:srgbClr val="BFBF00"/>
+                </a:solidFill>
+                <a:latin typeface="Lucida Console" panose="020B0609040504020204" pitchFamily="49" charset="0"/>
+              </a:rPr>
+              <a:t>true</a:t>
+            </a:r>
+            <a:r>
+              <a:rPr lang="en-US" dirty="0">
+                <a:solidFill>
+                  <a:prstClr val="black"/>
+                </a:solidFill>
+                <a:latin typeface="Lucida Console" panose="020B0609040504020204" pitchFamily="49" charset="0"/>
+              </a:rPr>
+              <a:t>;</a:t>
+            </a:r>
+          </a:p>
+          <a:p>
+            <a:r>
+              <a:rPr lang="en-US" dirty="0" err="1" smtClean="0">
+                <a:solidFill>
+                  <a:prstClr val="black"/>
+                </a:solidFill>
+                <a:latin typeface="Lucida Console" panose="020B0609040504020204" pitchFamily="49" charset="0"/>
+              </a:rPr>
+              <a:t>crate.position.x</a:t>
+            </a:r>
+            <a:r>
+              <a:rPr lang="en-US" dirty="0" smtClean="0">
+                <a:solidFill>
+                  <a:prstClr val="black"/>
+                </a:solidFill>
+                <a:latin typeface="Lucida Console" panose="020B0609040504020204" pitchFamily="49" charset="0"/>
+              </a:rPr>
+              <a:t> </a:t>
+            </a:r>
+            <a:r>
+              <a:rPr lang="en-US" dirty="0">
+                <a:solidFill>
+                  <a:prstClr val="black"/>
+                </a:solidFill>
+                <a:latin typeface="Lucida Console" panose="020B0609040504020204" pitchFamily="49" charset="0"/>
+              </a:rPr>
+              <a:t>= </a:t>
+            </a:r>
+            <a:r>
+              <a:rPr lang="en-US" dirty="0" err="1">
+                <a:solidFill>
+                  <a:srgbClr val="00BFBF"/>
+                </a:solidFill>
+                <a:latin typeface="Lucida Console" panose="020B0609040504020204" pitchFamily="49" charset="0"/>
+              </a:rPr>
+              <a:t>this</a:t>
+            </a:r>
+            <a:r>
+              <a:rPr lang="en-US" dirty="0" err="1">
+                <a:solidFill>
+                  <a:prstClr val="black"/>
+                </a:solidFill>
+                <a:latin typeface="Lucida Console" panose="020B0609040504020204" pitchFamily="49" charset="0"/>
+              </a:rPr>
+              <a:t>.generateRandomPosition</a:t>
+            </a:r>
+            <a:r>
+              <a:rPr lang="en-US" dirty="0">
+                <a:solidFill>
+                  <a:prstClr val="black"/>
+                </a:solidFill>
+                <a:latin typeface="Lucida Console" panose="020B0609040504020204" pitchFamily="49" charset="0"/>
+              </a:rPr>
+              <a:t>();</a:t>
+            </a:r>
+          </a:p>
+          <a:p>
+            <a:r>
+              <a:rPr lang="en-US" dirty="0" err="1" smtClean="0">
+                <a:solidFill>
+                  <a:prstClr val="black"/>
+                </a:solidFill>
+                <a:latin typeface="Lucida Console" panose="020B0609040504020204" pitchFamily="49" charset="0"/>
+              </a:rPr>
+              <a:t>crate.position.y</a:t>
+            </a:r>
+            <a:r>
+              <a:rPr lang="en-US" dirty="0" smtClean="0">
+                <a:solidFill>
+                  <a:prstClr val="black"/>
+                </a:solidFill>
+                <a:latin typeface="Lucida Console" panose="020B0609040504020204" pitchFamily="49" charset="0"/>
+              </a:rPr>
+              <a:t> </a:t>
+            </a:r>
+            <a:r>
+              <a:rPr lang="en-US" dirty="0">
+                <a:solidFill>
+                  <a:prstClr val="black"/>
+                </a:solidFill>
+                <a:latin typeface="Lucida Console" panose="020B0609040504020204" pitchFamily="49" charset="0"/>
+              </a:rPr>
+              <a:t>= 300;</a:t>
+            </a:r>
+          </a:p>
+          <a:p>
+            <a:r>
+              <a:rPr lang="en-US" dirty="0" err="1" smtClean="0">
+                <a:solidFill>
+                  <a:prstClr val="black"/>
+                </a:solidFill>
+                <a:latin typeface="Lucida Console" panose="020B0609040504020204" pitchFamily="49" charset="0"/>
+              </a:rPr>
+              <a:t>crate.position.z</a:t>
+            </a:r>
+            <a:r>
+              <a:rPr lang="en-US" dirty="0" smtClean="0">
+                <a:solidFill>
+                  <a:prstClr val="black"/>
+                </a:solidFill>
+                <a:latin typeface="Lucida Console" panose="020B0609040504020204" pitchFamily="49" charset="0"/>
+              </a:rPr>
+              <a:t> </a:t>
+            </a:r>
+            <a:r>
+              <a:rPr lang="en-US" dirty="0">
+                <a:solidFill>
+                  <a:prstClr val="black"/>
+                </a:solidFill>
+                <a:latin typeface="Lucida Console" panose="020B0609040504020204" pitchFamily="49" charset="0"/>
+              </a:rPr>
+              <a:t>= </a:t>
+            </a:r>
+            <a:r>
+              <a:rPr lang="en-US" dirty="0" err="1">
+                <a:solidFill>
+                  <a:srgbClr val="00BFBF"/>
+                </a:solidFill>
+                <a:latin typeface="Lucida Console" panose="020B0609040504020204" pitchFamily="49" charset="0"/>
+              </a:rPr>
+              <a:t>this</a:t>
+            </a:r>
+            <a:r>
+              <a:rPr lang="en-US" dirty="0" err="1">
+                <a:solidFill>
+                  <a:prstClr val="black"/>
+                </a:solidFill>
+                <a:latin typeface="Lucida Console" panose="020B0609040504020204" pitchFamily="49" charset="0"/>
+              </a:rPr>
+              <a:t>.generateRandomPosition</a:t>
+            </a:r>
+            <a:r>
+              <a:rPr lang="en-US" dirty="0">
+                <a:solidFill>
+                  <a:prstClr val="black"/>
+                </a:solidFill>
+                <a:latin typeface="Lucida Console" panose="020B0609040504020204" pitchFamily="49" charset="0"/>
+              </a:rPr>
+              <a:t>();</a:t>
+            </a:r>
+          </a:p>
+          <a:p>
+            <a:endParaRPr lang="en-US" dirty="0">
+              <a:solidFill>
+                <a:prstClr val="black"/>
+              </a:solidFill>
+              <a:latin typeface="Lucida Console" panose="020B0609040504020204" pitchFamily="49" charset="0"/>
+            </a:endParaRPr>
+          </a:p>
+          <a:p>
+            <a:r>
+              <a:rPr lang="en-US" dirty="0" err="1" smtClean="0">
+                <a:solidFill>
+                  <a:srgbClr val="00BFBF"/>
+                </a:solidFill>
+                <a:latin typeface="Lucida Console" panose="020B0609040504020204" pitchFamily="49" charset="0"/>
+              </a:rPr>
+              <a:t>this</a:t>
+            </a:r>
+            <a:r>
+              <a:rPr lang="en-US" dirty="0" err="1" smtClean="0">
+                <a:solidFill>
+                  <a:prstClr val="black"/>
+                </a:solidFill>
+                <a:latin typeface="Lucida Console" panose="020B0609040504020204" pitchFamily="49" charset="0"/>
+              </a:rPr>
+              <a:t>.scene.add</a:t>
+            </a:r>
+            <a:r>
+              <a:rPr lang="en-US" dirty="0" smtClean="0">
+                <a:solidFill>
+                  <a:prstClr val="black"/>
+                </a:solidFill>
+                <a:latin typeface="Lucida Console" panose="020B0609040504020204" pitchFamily="49" charset="0"/>
+              </a:rPr>
+              <a:t>(crate</a:t>
+            </a:r>
+            <a:r>
+              <a:rPr lang="en-US" dirty="0">
+                <a:solidFill>
+                  <a:prstClr val="black"/>
+                </a:solidFill>
+                <a:latin typeface="Lucida Console" panose="020B0609040504020204" pitchFamily="49" charset="0"/>
+              </a:rPr>
+              <a:t>);</a:t>
+            </a:r>
+            <a:endParaRPr lang="en-US" dirty="0"/>
+          </a:p>
+        </p:txBody>
+      </p:sp>
+    </p:spTree>
+    <p:extLst>
+      <p:ext uri="{BB962C8B-B14F-4D97-AF65-F5344CB8AC3E}">
+        <p14:creationId xmlns:p14="http://schemas.microsoft.com/office/powerpoint/2010/main" val="2877052804"/>
+      </p:ext>
+    </p:extLst>
+  </p:cSld>
+  <p:clrMapOvr>
+    <a:masterClrMapping/>
+  </p:clrMapOvr>
+</p:sld>
+</file>
+
+<file path=ppt/slides/slide15.xml><?xml version="1.0" encoding="utf-8"?>
+<p:sld xmlns:a="http://schemas.openxmlformats.org/drawingml/2006/main" xmlns:r="http://schemas.openxmlformats.org/officeDocument/2006/relationships" xmlns:p="http://schemas.openxmlformats.org/presentationml/2006/main">
+  <p:cSld>
+    <p:spTree>
+      <p:nvGrpSpPr>
+        <p:cNvPr id="1" name=""/>
+        <p:cNvGrpSpPr/>
+        <p:nvPr/>
+      </p:nvGrpSpPr>
+      <p:grpSpPr>
+        <a:xfrm>
+          <a:off x="0" y="0"/>
+          <a:ext cx="0" cy="0"/>
+          <a:chOff x="0" y="0"/>
+          <a:chExt cx="0" cy="0"/>
+        </a:xfrm>
+      </p:grpSpPr>
+      <p:sp>
+        <p:nvSpPr>
+          <p:cNvPr id="2" name="Title 1"/>
+          <p:cNvSpPr>
+            <a:spLocks noGrp="1"/>
+          </p:cNvSpPr>
+          <p:nvPr>
+            <p:ph type="title"/>
+          </p:nvPr>
+        </p:nvSpPr>
+        <p:spPr/>
+        <p:txBody>
+          <a:bodyPr/>
+          <a:lstStyle/>
+          <a:p>
+            <a:r>
+              <a:rPr lang="en-US" dirty="0" smtClean="0"/>
+              <a:t>Animation</a:t>
+            </a:r>
+            <a:endParaRPr lang="en-US" dirty="0"/>
+          </a:p>
+        </p:txBody>
+      </p:sp>
+      <p:sp>
+        <p:nvSpPr>
+          <p:cNvPr id="3" name="Content Placeholder 2"/>
+          <p:cNvSpPr>
+            <a:spLocks noGrp="1"/>
+          </p:cNvSpPr>
+          <p:nvPr>
+            <p:ph idx="1"/>
+          </p:nvPr>
+        </p:nvSpPr>
+        <p:spPr/>
+        <p:txBody>
+          <a:bodyPr>
+            <a:normAutofit/>
+          </a:bodyPr>
+          <a:lstStyle/>
+          <a:p>
+            <a:r>
+              <a:rPr lang="en-US" dirty="0" smtClean="0">
+                <a:solidFill>
+                  <a:prstClr val="black"/>
+                </a:solidFill>
+                <a:latin typeface="Lucida Console" panose="020B0609040504020204" pitchFamily="49" charset="0"/>
+              </a:rPr>
+              <a:t>animate</a:t>
+            </a:r>
+            <a:r>
+              <a:rPr lang="en-US" dirty="0">
+                <a:solidFill>
+                  <a:prstClr val="black"/>
+                </a:solidFill>
+                <a:latin typeface="Lucida Console" panose="020B0609040504020204" pitchFamily="49" charset="0"/>
+              </a:rPr>
+              <a:t>: </a:t>
+            </a:r>
+            <a:r>
+              <a:rPr lang="en-US" dirty="0">
+                <a:solidFill>
+                  <a:srgbClr val="00BFBF"/>
+                </a:solidFill>
+                <a:latin typeface="Lucida Console" panose="020B0609040504020204" pitchFamily="49" charset="0"/>
+              </a:rPr>
+              <a:t>function</a:t>
+            </a:r>
+            <a:r>
+              <a:rPr lang="en-US" dirty="0">
+                <a:solidFill>
+                  <a:prstClr val="black"/>
+                </a:solidFill>
+                <a:latin typeface="Lucida Console" panose="020B0609040504020204" pitchFamily="49" charset="0"/>
+              </a:rPr>
+              <a:t>() {</a:t>
+            </a:r>
+          </a:p>
+          <a:p>
+            <a:r>
+              <a:rPr lang="en-US" dirty="0" smtClean="0">
+                <a:solidFill>
+                  <a:srgbClr val="00BFBF"/>
+                </a:solidFill>
+                <a:latin typeface="Lucida Console" panose="020B0609040504020204" pitchFamily="49" charset="0"/>
+              </a:rPr>
+              <a:t>        </a:t>
+            </a:r>
+            <a:r>
+              <a:rPr lang="en-US" dirty="0" err="1" smtClean="0">
+                <a:solidFill>
+                  <a:srgbClr val="00BFBF"/>
+                </a:solidFill>
+                <a:latin typeface="Lucida Console" panose="020B0609040504020204" pitchFamily="49" charset="0"/>
+              </a:rPr>
+              <a:t>this</a:t>
+            </a:r>
+            <a:r>
+              <a:rPr lang="en-US" dirty="0" err="1" smtClean="0">
+                <a:solidFill>
+                  <a:prstClr val="black"/>
+                </a:solidFill>
+                <a:latin typeface="Lucida Console" panose="020B0609040504020204" pitchFamily="49" charset="0"/>
+              </a:rPr>
+              <a:t>.render</a:t>
+            </a:r>
+            <a:r>
+              <a:rPr lang="en-US" dirty="0">
+                <a:solidFill>
+                  <a:prstClr val="black"/>
+                </a:solidFill>
+                <a:latin typeface="Lucida Console" panose="020B0609040504020204" pitchFamily="49" charset="0"/>
+              </a:rPr>
+              <a:t>();</a:t>
+            </a:r>
+          </a:p>
+          <a:p>
+            <a:r>
+              <a:rPr lang="en-US" dirty="0" smtClean="0">
+                <a:solidFill>
+                  <a:prstClr val="black"/>
+                </a:solidFill>
+                <a:latin typeface="Lucida Console" panose="020B0609040504020204" pitchFamily="49" charset="0"/>
+              </a:rPr>
+              <a:t>        </a:t>
+            </a:r>
+            <a:r>
+              <a:rPr lang="en-US" dirty="0" err="1" smtClean="0">
+                <a:solidFill>
+                  <a:prstClr val="black"/>
+                </a:solidFill>
+                <a:latin typeface="Lucida Console" panose="020B0609040504020204" pitchFamily="49" charset="0"/>
+              </a:rPr>
+              <a:t>requestAnimationFrame</a:t>
+            </a:r>
+            <a:r>
+              <a:rPr lang="en-US" dirty="0" smtClean="0">
+                <a:solidFill>
+                  <a:prstClr val="black"/>
+                </a:solidFill>
+                <a:latin typeface="Lucida Console" panose="020B0609040504020204" pitchFamily="49" charset="0"/>
+              </a:rPr>
+              <a:t>(</a:t>
+            </a:r>
+            <a:r>
+              <a:rPr lang="en-US" dirty="0" smtClean="0">
+                <a:solidFill>
+                  <a:srgbClr val="00BFBF"/>
+                </a:solidFill>
+                <a:latin typeface="Lucida Console" panose="020B0609040504020204" pitchFamily="49" charset="0"/>
+              </a:rPr>
+              <a:t>function</a:t>
+            </a:r>
+            <a:r>
+              <a:rPr lang="en-US" dirty="0" smtClean="0">
+                <a:solidFill>
+                  <a:prstClr val="black"/>
+                </a:solidFill>
+                <a:latin typeface="Lucida Console" panose="020B0609040504020204" pitchFamily="49" charset="0"/>
+              </a:rPr>
+              <a:t>() {</a:t>
+            </a:r>
+            <a:endParaRPr lang="en-US" dirty="0">
+              <a:solidFill>
+                <a:prstClr val="black"/>
+              </a:solidFill>
+              <a:latin typeface="Lucida Console" panose="020B0609040504020204" pitchFamily="49" charset="0"/>
+            </a:endParaRPr>
+          </a:p>
+          <a:p>
+            <a:r>
+              <a:rPr lang="en-US" dirty="0">
+                <a:solidFill>
+                  <a:prstClr val="black"/>
+                </a:solidFill>
+                <a:latin typeface="Lucida Console" panose="020B0609040504020204" pitchFamily="49" charset="0"/>
+              </a:rPr>
+              <a:t>            </a:t>
+            </a:r>
+            <a:r>
+              <a:rPr lang="en-US" dirty="0" err="1">
+                <a:solidFill>
+                  <a:srgbClr val="BFBF00"/>
+                </a:solidFill>
+                <a:latin typeface="Lucida Console" panose="020B0609040504020204" pitchFamily="49" charset="0"/>
+              </a:rPr>
+              <a:t>self</a:t>
+            </a:r>
+            <a:r>
+              <a:rPr lang="en-US" dirty="0" err="1">
+                <a:solidFill>
+                  <a:prstClr val="black"/>
+                </a:solidFill>
+                <a:latin typeface="Lucida Console" panose="020B0609040504020204" pitchFamily="49" charset="0"/>
+              </a:rPr>
+              <a:t>.animate</a:t>
+            </a:r>
+            <a:r>
+              <a:rPr lang="en-US" dirty="0">
+                <a:solidFill>
+                  <a:prstClr val="black"/>
+                </a:solidFill>
+                <a:latin typeface="Lucida Console" panose="020B0609040504020204" pitchFamily="49" charset="0"/>
+              </a:rPr>
+              <a:t>();</a:t>
+            </a:r>
+          </a:p>
+          <a:p>
+            <a:r>
+              <a:rPr lang="en-US" dirty="0">
+                <a:solidFill>
+                  <a:prstClr val="black"/>
+                </a:solidFill>
+                <a:latin typeface="Lucida Console" panose="020B0609040504020204" pitchFamily="49" charset="0"/>
+              </a:rPr>
+              <a:t>        </a:t>
+            </a:r>
+            <a:r>
+              <a:rPr lang="en-US" dirty="0" smtClean="0">
+                <a:solidFill>
+                  <a:prstClr val="black"/>
+                </a:solidFill>
+                <a:latin typeface="Lucida Console" panose="020B0609040504020204" pitchFamily="49" charset="0"/>
+              </a:rPr>
+              <a:t>});</a:t>
+            </a:r>
+          </a:p>
+          <a:p>
+            <a:r>
+              <a:rPr lang="en-US" dirty="0">
+                <a:solidFill>
+                  <a:prstClr val="black"/>
+                </a:solidFill>
+                <a:latin typeface="Lucida Console" panose="020B0609040504020204" pitchFamily="49" charset="0"/>
+              </a:rPr>
+              <a:t>}</a:t>
+            </a:r>
+          </a:p>
+        </p:txBody>
+      </p:sp>
+    </p:spTree>
+    <p:extLst>
+      <p:ext uri="{BB962C8B-B14F-4D97-AF65-F5344CB8AC3E}">
+        <p14:creationId xmlns:p14="http://schemas.microsoft.com/office/powerpoint/2010/main" val="1934745196"/>
+      </p:ext>
+    </p:extLst>
+  </p:cSld>
+  <p:clrMapOvr>
+    <a:masterClrMapping/>
+  </p:clrMapOvr>
+</p:sld>
+</file>
+
 <file path=ppt/slides/slide2.xml><?xml version="1.0" encoding="utf-8"?>
 <p:sld xmlns:a="http://schemas.openxmlformats.org/drawingml/2006/main" xmlns:r="http://schemas.openxmlformats.org/officeDocument/2006/relationships" xmlns:p="http://schemas.openxmlformats.org/presentationml/2006/main">
   <p:cSld>
@@ -3881,7 +5993,6 @@
               <a:rPr lang="en-US" dirty="0" smtClean="0"/>
               <a:t>File Access</a:t>
             </a:r>
-            <a:endParaRPr lang="en-US" dirty="0" smtClean="0"/>
           </a:p>
           <a:p>
             <a:r>
@@ -4296,8 +6407,10 @@
           <a:lstStyle/>
           <a:p>
             <a:r>
-              <a:rPr lang="en-US" dirty="0" smtClean="0"/>
-              <a:t>Nathan</a:t>
+              <a:rPr lang="en-US" dirty="0">
+                <a:hlinkClick r:id="rId2"/>
+              </a:rPr>
+              <a:t>http://html5demo-nburana.appspot.com/</a:t>
             </a:r>
             <a:endParaRPr lang="en-US" dirty="0"/>
           </a:p>
@@ -4314,7 +6427,7 @@
           </p:nvPr>
         </p:nvPicPr>
         <p:blipFill>
-          <a:blip r:embed="rId2">
+          <a:blip r:embed="rId3">
             <a:extLst>
               <a:ext uri="{28A0092B-C50C-407E-A947-70E740481C1C}">
                 <a14:useLocalDpi xmlns:a14="http://schemas.microsoft.com/office/drawing/2010/main" val="0"/>
@@ -4343,7 +6456,7 @@
           <a:bodyPr/>
           <a:lstStyle/>
           <a:p>
-            <a:endParaRPr lang="en-US"/>
+            <a:endParaRPr lang="en-US" dirty="0"/>
           </a:p>
         </p:txBody>
       </p:sp>
@@ -4393,8 +6506,10 @@
           <a:lstStyle/>
           <a:p>
             <a:r>
-              <a:rPr lang="en-US" dirty="0" smtClean="0"/>
-              <a:t>Draw a Rectangle</a:t>
+              <a:rPr lang="en-US" dirty="0">
+                <a:hlinkClick r:id="rId2"/>
+              </a:rPr>
+              <a:t>https://github.com/nburana/html5demo</a:t>
             </a:r>
             <a:endParaRPr lang="en-US" dirty="0"/>
           </a:p>
@@ -4416,271 +6531,6 @@
             <a:normAutofit/>
           </a:bodyPr>
           <a:lstStyle/>
-          <a:p>
-            <a:r>
-              <a:rPr lang="en-US" dirty="0" err="1">
-                <a:solidFill>
-                  <a:srgbClr val="00BFBF"/>
-                </a:solidFill>
-                <a:latin typeface="Lucida Console" panose="020B0609040504020204" pitchFamily="49" charset="0"/>
-              </a:rPr>
-              <a:t>var</a:t>
-            </a:r>
-            <a:r>
-              <a:rPr lang="en-US" dirty="0">
-                <a:solidFill>
-                  <a:prstClr val="black"/>
-                </a:solidFill>
-                <a:latin typeface="Lucida Console" panose="020B0609040504020204" pitchFamily="49" charset="0"/>
-              </a:rPr>
-              <a:t> canvas = </a:t>
-            </a:r>
-            <a:r>
-              <a:rPr lang="en-US" dirty="0" err="1">
-                <a:solidFill>
-                  <a:srgbClr val="BFBF00"/>
-                </a:solidFill>
-                <a:latin typeface="Lucida Console" panose="020B0609040504020204" pitchFamily="49" charset="0"/>
-              </a:rPr>
-              <a:t>document</a:t>
-            </a:r>
-            <a:r>
-              <a:rPr lang="en-US" dirty="0" err="1">
-                <a:solidFill>
-                  <a:prstClr val="black"/>
-                </a:solidFill>
-                <a:latin typeface="Lucida Console" panose="020B0609040504020204" pitchFamily="49" charset="0"/>
-              </a:rPr>
-              <a:t>.getElementById</a:t>
-            </a:r>
-            <a:r>
-              <a:rPr lang="en-US" dirty="0">
-                <a:solidFill>
-                  <a:prstClr val="black"/>
-                </a:solidFill>
-                <a:latin typeface="Lucida Console" panose="020B0609040504020204" pitchFamily="49" charset="0"/>
-              </a:rPr>
-              <a:t>(</a:t>
-            </a:r>
-            <a:r>
-              <a:rPr lang="en-US" dirty="0">
-                <a:solidFill>
-                  <a:srgbClr val="BFBF00"/>
-                </a:solidFill>
-                <a:latin typeface="Lucida Console" panose="020B0609040504020204" pitchFamily="49" charset="0"/>
-              </a:rPr>
-              <a:t>'</a:t>
-            </a:r>
-            <a:r>
-              <a:rPr lang="en-US" dirty="0" err="1">
-                <a:solidFill>
-                  <a:srgbClr val="BFBF00"/>
-                </a:solidFill>
-                <a:latin typeface="Lucida Console" panose="020B0609040504020204" pitchFamily="49" charset="0"/>
-              </a:rPr>
-              <a:t>myCanvas</a:t>
-            </a:r>
-            <a:r>
-              <a:rPr lang="en-US" dirty="0">
-                <a:solidFill>
-                  <a:srgbClr val="BFBF00"/>
-                </a:solidFill>
-                <a:latin typeface="Lucida Console" panose="020B0609040504020204" pitchFamily="49" charset="0"/>
-              </a:rPr>
-              <a:t>'</a:t>
-            </a:r>
-            <a:r>
-              <a:rPr lang="en-US" dirty="0">
-                <a:solidFill>
-                  <a:prstClr val="black"/>
-                </a:solidFill>
-                <a:latin typeface="Lucida Console" panose="020B0609040504020204" pitchFamily="49" charset="0"/>
-              </a:rPr>
-              <a:t>);</a:t>
-            </a:r>
-          </a:p>
-          <a:p>
-            <a:r>
-              <a:rPr lang="en-US" dirty="0" err="1">
-                <a:solidFill>
-                  <a:srgbClr val="00BFBF"/>
-                </a:solidFill>
-                <a:latin typeface="Lucida Console" panose="020B0609040504020204" pitchFamily="49" charset="0"/>
-              </a:rPr>
-              <a:t>var</a:t>
-            </a:r>
-            <a:r>
-              <a:rPr lang="en-US" dirty="0">
-                <a:solidFill>
-                  <a:prstClr val="black"/>
-                </a:solidFill>
-                <a:latin typeface="Lucida Console" panose="020B0609040504020204" pitchFamily="49" charset="0"/>
-              </a:rPr>
-              <a:t> context = </a:t>
-            </a:r>
-            <a:r>
-              <a:rPr lang="en-US" dirty="0" err="1">
-                <a:solidFill>
-                  <a:prstClr val="black"/>
-                </a:solidFill>
-                <a:latin typeface="Lucida Console" panose="020B0609040504020204" pitchFamily="49" charset="0"/>
-              </a:rPr>
-              <a:t>canvas.getContext</a:t>
-            </a:r>
-            <a:r>
-              <a:rPr lang="en-US" dirty="0">
-                <a:solidFill>
-                  <a:prstClr val="black"/>
-                </a:solidFill>
-                <a:latin typeface="Lucida Console" panose="020B0609040504020204" pitchFamily="49" charset="0"/>
-              </a:rPr>
-              <a:t>(</a:t>
-            </a:r>
-            <a:r>
-              <a:rPr lang="en-US" dirty="0">
-                <a:solidFill>
-                  <a:srgbClr val="BFBF00"/>
-                </a:solidFill>
-                <a:latin typeface="Lucida Console" panose="020B0609040504020204" pitchFamily="49" charset="0"/>
-              </a:rPr>
-              <a:t>'2d'</a:t>
-            </a:r>
-            <a:r>
-              <a:rPr lang="en-US" dirty="0">
-                <a:solidFill>
-                  <a:prstClr val="black"/>
-                </a:solidFill>
-                <a:latin typeface="Lucida Console" panose="020B0609040504020204" pitchFamily="49" charset="0"/>
-              </a:rPr>
-              <a:t>);</a:t>
-            </a:r>
-          </a:p>
-          <a:p>
-            <a:endParaRPr lang="en-US" dirty="0">
-              <a:solidFill>
-                <a:prstClr val="black"/>
-              </a:solidFill>
-              <a:latin typeface="Lucida Console" panose="020B0609040504020204" pitchFamily="49" charset="0"/>
-            </a:endParaRPr>
-          </a:p>
-          <a:p>
-            <a:r>
-              <a:rPr lang="en-US" dirty="0" err="1">
-                <a:solidFill>
-                  <a:prstClr val="black"/>
-                </a:solidFill>
-                <a:latin typeface="Lucida Console" panose="020B0609040504020204" pitchFamily="49" charset="0"/>
-              </a:rPr>
-              <a:t>context.beginPath</a:t>
-            </a:r>
-            <a:r>
-              <a:rPr lang="en-US" dirty="0">
-                <a:solidFill>
-                  <a:prstClr val="black"/>
-                </a:solidFill>
-                <a:latin typeface="Lucida Console" panose="020B0609040504020204" pitchFamily="49" charset="0"/>
-              </a:rPr>
-              <a:t>();</a:t>
-            </a:r>
-          </a:p>
-          <a:p>
-            <a:r>
-              <a:rPr lang="en-US" dirty="0" err="1">
-                <a:solidFill>
-                  <a:prstClr val="black"/>
-                </a:solidFill>
-                <a:latin typeface="Lucida Console" panose="020B0609040504020204" pitchFamily="49" charset="0"/>
-              </a:rPr>
-              <a:t>context.rect</a:t>
-            </a:r>
-            <a:r>
-              <a:rPr lang="en-US" dirty="0">
-                <a:solidFill>
-                  <a:prstClr val="black"/>
-                </a:solidFill>
-                <a:latin typeface="Lucida Console" panose="020B0609040504020204" pitchFamily="49" charset="0"/>
-              </a:rPr>
-              <a:t>(188, 50, 200, 100);</a:t>
-            </a:r>
-          </a:p>
-          <a:p>
-            <a:r>
-              <a:rPr lang="en-US" dirty="0" err="1">
-                <a:solidFill>
-                  <a:prstClr val="black"/>
-                </a:solidFill>
-                <a:latin typeface="Lucida Console" panose="020B0609040504020204" pitchFamily="49" charset="0"/>
-              </a:rPr>
-              <a:t>context.lineWidth</a:t>
-            </a:r>
-            <a:r>
-              <a:rPr lang="en-US" dirty="0">
-                <a:solidFill>
-                  <a:prstClr val="black"/>
-                </a:solidFill>
-                <a:latin typeface="Lucida Console" panose="020B0609040504020204" pitchFamily="49" charset="0"/>
-              </a:rPr>
-              <a:t> = 7;</a:t>
-            </a:r>
-          </a:p>
-          <a:p>
-            <a:r>
-              <a:rPr lang="en-US" dirty="0" err="1">
-                <a:solidFill>
-                  <a:prstClr val="black"/>
-                </a:solidFill>
-                <a:latin typeface="Lucida Console" panose="020B0609040504020204" pitchFamily="49" charset="0"/>
-              </a:rPr>
-              <a:t>context.strokeStyle</a:t>
-            </a:r>
-            <a:r>
-              <a:rPr lang="en-US" dirty="0">
-                <a:solidFill>
-                  <a:prstClr val="black"/>
-                </a:solidFill>
-                <a:latin typeface="Lucida Console" panose="020B0609040504020204" pitchFamily="49" charset="0"/>
-              </a:rPr>
-              <a:t> = </a:t>
-            </a:r>
-            <a:r>
-              <a:rPr lang="en-US" dirty="0">
-                <a:solidFill>
-                  <a:srgbClr val="BFBF00"/>
-                </a:solidFill>
-                <a:latin typeface="Lucida Console" panose="020B0609040504020204" pitchFamily="49" charset="0"/>
-              </a:rPr>
-              <a:t>'black'</a:t>
-            </a:r>
-            <a:r>
-              <a:rPr lang="en-US" dirty="0">
-                <a:solidFill>
-                  <a:prstClr val="black"/>
-                </a:solidFill>
-                <a:latin typeface="Lucida Console" panose="020B0609040504020204" pitchFamily="49" charset="0"/>
-              </a:rPr>
-              <a:t>;</a:t>
-            </a:r>
-          </a:p>
-          <a:p>
-            <a:r>
-              <a:rPr lang="en-US" dirty="0" err="1">
-                <a:solidFill>
-                  <a:prstClr val="black"/>
-                </a:solidFill>
-                <a:latin typeface="Lucida Console" panose="020B0609040504020204" pitchFamily="49" charset="0"/>
-              </a:rPr>
-              <a:t>context.stroke</a:t>
-            </a:r>
-            <a:r>
-              <a:rPr lang="en-US" dirty="0">
-                <a:solidFill>
-                  <a:prstClr val="black"/>
-                </a:solidFill>
-                <a:latin typeface="Lucida Console" panose="020B0609040504020204" pitchFamily="49" charset="0"/>
-              </a:rPr>
-              <a:t>();</a:t>
-            </a:r>
-          </a:p>
           <a:p>
             <a:endParaRPr lang="en-US" dirty="0"/>
           </a:p>
@@ -4738,22 +6588,41 @@
           <a:bodyPr/>
           <a:lstStyle/>
           <a:p>
+            <a:endParaRPr lang="en-US"/>
+          </a:p>
+        </p:txBody>
+      </p:sp>
+      <p:sp>
+        <p:nvSpPr>
+          <p:cNvPr id="3" name="Text Placeholder 2"/>
+          <p:cNvSpPr>
+            <a:spLocks noGrp="1"/>
+          </p:cNvSpPr>
+          <p:nvPr>
+            <p:ph type="body" idx="1"/>
+          </p:nvPr>
+        </p:nvSpPr>
+        <p:spPr/>
+        <p:txBody>
+          <a:bodyPr/>
+          <a:lstStyle/>
+          <a:p>
             <a:r>
               <a:rPr lang="en-US" dirty="0" smtClean="0"/>
-              <a:t>Basic setup</a:t>
-            </a:r>
-            <a:endParaRPr lang="en-US" dirty="0"/>
-          </a:p>
-        </p:txBody>
-      </p:sp>
-      <p:sp>
-        <p:nvSpPr>
-          <p:cNvPr id="3" name="Content Placeholder 2"/>
-          <p:cNvSpPr>
-            <a:spLocks noGrp="1"/>
-          </p:cNvSpPr>
-          <p:nvPr>
-            <p:ph idx="1"/>
+              <a:t>Unnecessary technologies</a:t>
+            </a:r>
+            <a:endParaRPr lang="en-US" dirty="0"/>
+          </a:p>
+        </p:txBody>
+      </p:sp>
+      <p:sp>
+        <p:nvSpPr>
+          <p:cNvPr id="4" name="Content Placeholder 3"/>
+          <p:cNvSpPr>
+            <a:spLocks noGrp="1"/>
+          </p:cNvSpPr>
+          <p:nvPr>
+            <p:ph sz="half" idx="2"/>
           </p:nvPr>
         </p:nvSpPr>
         <p:spPr/>
@@ -4761,14 +6630,645 @@
           <a:bodyPr/>
           <a:lstStyle/>
           <a:p>
-            <a:endParaRPr lang="en-US" dirty="0"/>
+            <a:pPr>
+              <a:buFont typeface="Wingdings" panose="05000000000000000000" pitchFamily="2" charset="2"/>
+              <a:buChar char="§"/>
+            </a:pPr>
+            <a:r>
+              <a:rPr lang="en-US" dirty="0" err="1" smtClean="0"/>
+              <a:t>AppEngine</a:t>
+            </a:r>
+            <a:endParaRPr lang="en-US" dirty="0" smtClean="0"/>
+          </a:p>
+          <a:p>
+            <a:pPr>
+              <a:buFont typeface="Wingdings" panose="05000000000000000000" pitchFamily="2" charset="2"/>
+              <a:buChar char="§"/>
+            </a:pPr>
+            <a:r>
+              <a:rPr lang="en-US" dirty="0" smtClean="0"/>
+              <a:t>$</a:t>
+            </a:r>
+          </a:p>
+          <a:p>
+            <a:pPr>
+              <a:buFont typeface="Wingdings" panose="05000000000000000000" pitchFamily="2" charset="2"/>
+              <a:buChar char="§"/>
+            </a:pPr>
+            <a:r>
+              <a:rPr lang="en-US" dirty="0" smtClean="0"/>
+              <a:t>_</a:t>
+            </a:r>
+          </a:p>
+          <a:p>
+            <a:pPr>
+              <a:buFont typeface="Wingdings" panose="05000000000000000000" pitchFamily="2" charset="2"/>
+              <a:buChar char="§"/>
+            </a:pPr>
+            <a:r>
+              <a:rPr lang="en-US" dirty="0" smtClean="0"/>
+              <a:t>Backbone.js</a:t>
+            </a:r>
+          </a:p>
+          <a:p>
+            <a:pPr>
+              <a:buFont typeface="Wingdings" panose="05000000000000000000" pitchFamily="2" charset="2"/>
+              <a:buChar char="§"/>
+            </a:pPr>
+            <a:r>
+              <a:rPr lang="en-US" dirty="0" smtClean="0"/>
+              <a:t>Blender</a:t>
+            </a:r>
+            <a:endParaRPr lang="en-US" dirty="0"/>
+          </a:p>
+        </p:txBody>
+      </p:sp>
+      <p:sp>
+        <p:nvSpPr>
+          <p:cNvPr id="5" name="Text Placeholder 4"/>
+          <p:cNvSpPr>
+            <a:spLocks noGrp="1"/>
+          </p:cNvSpPr>
+          <p:nvPr>
+            <p:ph type="body" sz="quarter" idx="3"/>
+          </p:nvPr>
+        </p:nvSpPr>
+        <p:spPr/>
+        <p:txBody>
+          <a:bodyPr/>
+          <a:lstStyle/>
+          <a:p>
+            <a:r>
+              <a:rPr lang="en-US" dirty="0" smtClean="0"/>
+              <a:t>Necessary</a:t>
+            </a:r>
+            <a:endParaRPr lang="en-US" dirty="0"/>
+          </a:p>
+        </p:txBody>
+      </p:sp>
+      <p:sp>
+        <p:nvSpPr>
+          <p:cNvPr id="6" name="Content Placeholder 5"/>
+          <p:cNvSpPr>
+            <a:spLocks noGrp="1"/>
+          </p:cNvSpPr>
+          <p:nvPr>
+            <p:ph sz="quarter" idx="4"/>
+          </p:nvPr>
+        </p:nvSpPr>
+        <p:spPr/>
+        <p:txBody>
+          <a:bodyPr/>
+          <a:lstStyle/>
+          <a:p>
+            <a:pPr>
+              <a:buFont typeface="Wingdings" panose="05000000000000000000" pitchFamily="2" charset="2"/>
+              <a:buChar char="§"/>
+            </a:pPr>
+            <a:r>
+              <a:rPr lang="en-US" dirty="0" smtClean="0"/>
+              <a:t>Three.js</a:t>
+            </a:r>
+          </a:p>
+          <a:p>
+            <a:pPr>
+              <a:buFont typeface="Wingdings" panose="05000000000000000000" pitchFamily="2" charset="2"/>
+              <a:buChar char="§"/>
+            </a:pPr>
+            <a:r>
+              <a:rPr lang="en-US" dirty="0" smtClean="0"/>
+              <a:t>Ammo.js (Bullet C++ API)</a:t>
+            </a:r>
+          </a:p>
+          <a:p>
+            <a:pPr>
+              <a:buFont typeface="Wingdings" panose="05000000000000000000" pitchFamily="2" charset="2"/>
+              <a:buChar char="§"/>
+            </a:pPr>
+            <a:r>
+              <a:rPr lang="en-US" dirty="0" smtClean="0"/>
+              <a:t>Physi.js</a:t>
+            </a:r>
           </a:p>
         </p:txBody>
       </p:sp>
     </p:spTree>
     <p:extLst>
       <p:ext uri="{BB962C8B-B14F-4D97-AF65-F5344CB8AC3E}">
-        <p14:creationId xmlns:p14="http://schemas.microsoft.com/office/powerpoint/2010/main" val="4099239408"/>
+        <p14:creationId xmlns:p14="http://schemas.microsoft.com/office/powerpoint/2010/main" val="2481191665"/>
+      </p:ext>
+    </p:extLst>
+  </p:cSld>
+  <p:clrMapOvr>
+    <a:masterClrMapping/>
+  </p:clrMapOvr>
+</p:sld>
+</file>
+
+<file path=ppt/slides/slide8.xml><?xml version="1.0" encoding="utf-8"?>
+<p:sld xmlns:a="http://schemas.openxmlformats.org/drawingml/2006/main" xmlns:r="http://schemas.openxmlformats.org/officeDocument/2006/relationships" xmlns:p="http://schemas.openxmlformats.org/presentationml/2006/main">
+  <p:cSld>
+    <p:spTree>
+      <p:nvGrpSpPr>
+        <p:cNvPr id="1" name=""/>
+        <p:cNvGrpSpPr/>
+        <p:nvPr/>
+      </p:nvGrpSpPr>
+      <p:grpSpPr>
+        <a:xfrm>
+          <a:off x="0" y="0"/>
+          <a:ext cx="0" cy="0"/>
+          <a:chOff x="0" y="0"/>
+          <a:chExt cx="0" cy="0"/>
+        </a:xfrm>
+      </p:grpSpPr>
+      <p:sp>
+        <p:nvSpPr>
+          <p:cNvPr id="2" name="Title 1"/>
+          <p:cNvSpPr>
+            <a:spLocks noGrp="1"/>
+          </p:cNvSpPr>
+          <p:nvPr>
+            <p:ph type="title"/>
+          </p:nvPr>
+        </p:nvSpPr>
+        <p:spPr/>
+        <p:txBody>
+          <a:bodyPr/>
+          <a:lstStyle/>
+          <a:p>
+            <a:r>
+              <a:rPr lang="en-US" dirty="0" smtClean="0"/>
+              <a:t>Basic Pieces</a:t>
+            </a:r>
+            <a:endParaRPr lang="en-US" dirty="0"/>
+          </a:p>
+        </p:txBody>
+      </p:sp>
+      <p:sp>
+        <p:nvSpPr>
+          <p:cNvPr id="3" name="Content Placeholder 2"/>
+          <p:cNvSpPr>
+            <a:spLocks noGrp="1"/>
+          </p:cNvSpPr>
+          <p:nvPr>
+            <p:ph idx="1"/>
+          </p:nvPr>
+        </p:nvSpPr>
+        <p:spPr/>
+        <p:txBody>
+          <a:bodyPr/>
+          <a:lstStyle/>
+          <a:p>
+            <a:pPr>
+              <a:buFont typeface="Wingdings" panose="05000000000000000000" pitchFamily="2" charset="2"/>
+              <a:buChar char="§"/>
+            </a:pPr>
+            <a:r>
+              <a:rPr lang="en-US" dirty="0" smtClean="0"/>
+              <a:t>Renderer</a:t>
+            </a:r>
+          </a:p>
+          <a:p>
+            <a:pPr>
+              <a:buFont typeface="Wingdings" panose="05000000000000000000" pitchFamily="2" charset="2"/>
+              <a:buChar char="§"/>
+            </a:pPr>
+            <a:r>
+              <a:rPr lang="en-US" dirty="0" smtClean="0"/>
+              <a:t>Scene</a:t>
+            </a:r>
+          </a:p>
+          <a:p>
+            <a:pPr>
+              <a:buFont typeface="Wingdings" panose="05000000000000000000" pitchFamily="2" charset="2"/>
+              <a:buChar char="§"/>
+            </a:pPr>
+            <a:r>
+              <a:rPr lang="en-US" dirty="0" smtClean="0"/>
+              <a:t>Camera</a:t>
+            </a:r>
+          </a:p>
+          <a:p>
+            <a:pPr>
+              <a:buFont typeface="Wingdings" panose="05000000000000000000" pitchFamily="2" charset="2"/>
+              <a:buChar char="§"/>
+            </a:pPr>
+            <a:r>
+              <a:rPr lang="en-US" dirty="0" smtClean="0"/>
+              <a:t>Lighting</a:t>
+            </a:r>
+          </a:p>
+          <a:p>
+            <a:pPr>
+              <a:buFont typeface="Wingdings" panose="05000000000000000000" pitchFamily="2" charset="2"/>
+              <a:buChar char="§"/>
+            </a:pPr>
+            <a:r>
+              <a:rPr lang="en-US" dirty="0" smtClean="0"/>
+              <a:t>Optional</a:t>
+            </a:r>
+          </a:p>
+          <a:p>
+            <a:pPr lvl="1">
+              <a:buFont typeface="Wingdings" panose="05000000000000000000" pitchFamily="2" charset="2"/>
+              <a:buChar char="§"/>
+            </a:pPr>
+            <a:r>
+              <a:rPr lang="en-US" dirty="0" smtClean="0"/>
+              <a:t>Geometries</a:t>
+            </a:r>
+          </a:p>
+          <a:p>
+            <a:pPr lvl="1">
+              <a:buFont typeface="Wingdings" panose="05000000000000000000" pitchFamily="2" charset="2"/>
+              <a:buChar char="§"/>
+            </a:pPr>
+            <a:r>
+              <a:rPr lang="en-US" dirty="0" smtClean="0"/>
+              <a:t>Physics</a:t>
+            </a:r>
+            <a:endParaRPr lang="en-US" dirty="0"/>
+          </a:p>
+        </p:txBody>
+      </p:sp>
+    </p:spTree>
+    <p:extLst>
+      <p:ext uri="{BB962C8B-B14F-4D97-AF65-F5344CB8AC3E}">
+        <p14:creationId xmlns:p14="http://schemas.microsoft.com/office/powerpoint/2010/main" val="703822142"/>
+      </p:ext>
+    </p:extLst>
+  </p:cSld>
+  <p:clrMapOvr>
+    <a:masterClrMapping/>
+  </p:clrMapOvr>
+</p:sld>
+</file>
+
+<file path=ppt/slides/slide9.xml><?xml version="1.0" encoding="utf-8"?>
+<p:sld xmlns:a="http://schemas.openxmlformats.org/drawingml/2006/main" xmlns:r="http://schemas.openxmlformats.org/officeDocument/2006/relationships" xmlns:p="http://schemas.openxmlformats.org/presentationml/2006/main">
+  <p:cSld>
+    <p:spTree>
+      <p:nvGrpSpPr>
+        <p:cNvPr id="1" name=""/>
+        <p:cNvGrpSpPr/>
+        <p:nvPr/>
+      </p:nvGrpSpPr>
+      <p:grpSpPr>
+        <a:xfrm>
+          <a:off x="0" y="0"/>
+          <a:ext cx="0" cy="0"/>
+          <a:chOff x="0" y="0"/>
+          <a:chExt cx="0" cy="0"/>
+        </a:xfrm>
+      </p:grpSpPr>
+      <p:sp>
+        <p:nvSpPr>
+          <p:cNvPr id="2" name="Title 1"/>
+          <p:cNvSpPr>
+            <a:spLocks noGrp="1"/>
+          </p:cNvSpPr>
+          <p:nvPr>
+            <p:ph type="title"/>
+          </p:nvPr>
+        </p:nvSpPr>
+        <p:spPr/>
+        <p:txBody>
+          <a:bodyPr/>
+          <a:lstStyle/>
+          <a:p>
+            <a:r>
+              <a:rPr lang="en-US" dirty="0" smtClean="0"/>
+              <a:t>Renderer</a:t>
+            </a:r>
+            <a:endParaRPr lang="en-US" dirty="0"/>
+          </a:p>
+        </p:txBody>
+      </p:sp>
+      <p:sp>
+        <p:nvSpPr>
+          <p:cNvPr id="3" name="Content Placeholder 2"/>
+          <p:cNvSpPr>
+            <a:spLocks noGrp="1"/>
+          </p:cNvSpPr>
+          <p:nvPr>
+            <p:ph idx="1"/>
+          </p:nvPr>
+        </p:nvSpPr>
+        <p:spPr/>
+        <p:txBody>
+          <a:bodyPr/>
+          <a:lstStyle/>
+          <a:p>
+            <a:r>
+              <a:rPr lang="en-US" dirty="0" err="1" smtClean="0">
+                <a:solidFill>
+                  <a:srgbClr val="00BFBF"/>
+                </a:solidFill>
+                <a:latin typeface="Lucida Console" panose="020B0609040504020204" pitchFamily="49" charset="0"/>
+              </a:rPr>
+              <a:t>this</a:t>
+            </a:r>
+            <a:r>
+              <a:rPr lang="en-US" dirty="0" err="1" smtClean="0">
+                <a:solidFill>
+                  <a:prstClr val="black"/>
+                </a:solidFill>
+                <a:latin typeface="Lucida Console" panose="020B0609040504020204" pitchFamily="49" charset="0"/>
+              </a:rPr>
+              <a:t>.renderer</a:t>
+            </a:r>
+            <a:r>
+              <a:rPr lang="en-US" dirty="0" smtClean="0">
+                <a:solidFill>
+                  <a:prstClr val="black"/>
+                </a:solidFill>
+                <a:latin typeface="Lucida Console" panose="020B0609040504020204" pitchFamily="49" charset="0"/>
+              </a:rPr>
+              <a:t> </a:t>
+            </a:r>
+            <a:r>
+              <a:rPr lang="en-US" dirty="0">
+                <a:solidFill>
+                  <a:prstClr val="black"/>
+                </a:solidFill>
+                <a:latin typeface="Lucida Console" panose="020B0609040504020204" pitchFamily="49" charset="0"/>
+              </a:rPr>
+              <a:t>= </a:t>
+            </a:r>
+            <a:r>
+              <a:rPr lang="en-US" dirty="0">
+                <a:solidFill>
+                  <a:srgbClr val="BFBF00"/>
+                </a:solidFill>
+                <a:latin typeface="Lucida Console" panose="020B0609040504020204" pitchFamily="49" charset="0"/>
+              </a:rPr>
+              <a:t>new</a:t>
+            </a:r>
+            <a:r>
+              <a:rPr lang="en-US" dirty="0">
+                <a:solidFill>
+                  <a:prstClr val="black"/>
+                </a:solidFill>
+                <a:latin typeface="Lucida Console" panose="020B0609040504020204" pitchFamily="49" charset="0"/>
+              </a:rPr>
+              <a:t> </a:t>
+            </a:r>
+            <a:r>
+              <a:rPr lang="en-US" dirty="0" err="1">
+                <a:solidFill>
+                  <a:prstClr val="black"/>
+                </a:solidFill>
+                <a:latin typeface="Lucida Console" panose="020B0609040504020204" pitchFamily="49" charset="0"/>
+              </a:rPr>
+              <a:t>THREE.WebGLRenderer</a:t>
+            </a:r>
+            <a:r>
+              <a:rPr lang="en-US" dirty="0">
+                <a:solidFill>
+                  <a:prstClr val="black"/>
+                </a:solidFill>
+                <a:latin typeface="Lucida Console" panose="020B0609040504020204" pitchFamily="49" charset="0"/>
+              </a:rPr>
+              <a:t>();</a:t>
+            </a:r>
+          </a:p>
+          <a:p>
+            <a:r>
+              <a:rPr lang="en-US" dirty="0" err="1" smtClean="0">
+                <a:solidFill>
+                  <a:srgbClr val="00BFBF"/>
+                </a:solidFill>
+                <a:latin typeface="Lucida Console" panose="020B0609040504020204" pitchFamily="49" charset="0"/>
+              </a:rPr>
+              <a:t>this</a:t>
+            </a:r>
+            <a:r>
+              <a:rPr lang="en-US" dirty="0" err="1" smtClean="0">
+                <a:solidFill>
+                  <a:prstClr val="black"/>
+                </a:solidFill>
+                <a:latin typeface="Lucida Console" panose="020B0609040504020204" pitchFamily="49" charset="0"/>
+              </a:rPr>
+              <a:t>.renderer.setSize</a:t>
+            </a:r>
+            <a:r>
+              <a:rPr lang="en-US" dirty="0" smtClean="0">
+                <a:solidFill>
+                  <a:prstClr val="black"/>
+                </a:solidFill>
+                <a:latin typeface="Lucida Console" panose="020B0609040504020204" pitchFamily="49" charset="0"/>
+              </a:rPr>
+              <a:t>(</a:t>
+            </a:r>
+            <a:r>
+              <a:rPr lang="en-US" dirty="0" smtClean="0">
+                <a:solidFill>
+                  <a:srgbClr val="00BFBF"/>
+                </a:solidFill>
+                <a:latin typeface="Lucida Console" panose="020B0609040504020204" pitchFamily="49" charset="0"/>
+              </a:rPr>
+              <a:t>this</a:t>
+            </a:r>
+            <a:r>
+              <a:rPr lang="en-US" dirty="0">
+                <a:solidFill>
+                  <a:prstClr val="black"/>
+                </a:solidFill>
+                <a:latin typeface="Lucida Console" panose="020B0609040504020204" pitchFamily="49" charset="0"/>
+              </a:rPr>
+              <a:t>.$(</a:t>
+            </a:r>
+            <a:r>
+              <a:rPr lang="en-US" dirty="0">
+                <a:solidFill>
+                  <a:srgbClr val="BFBF00"/>
+                </a:solidFill>
+                <a:latin typeface="Lucida Console" panose="020B0609040504020204" pitchFamily="49" charset="0"/>
+              </a:rPr>
+              <a:t>'#</a:t>
+            </a:r>
+            <a:r>
+              <a:rPr lang="en-US" dirty="0" err="1">
+                <a:solidFill>
+                  <a:srgbClr val="BFBF00"/>
+                </a:solidFill>
+                <a:latin typeface="Lucida Console" panose="020B0609040504020204" pitchFamily="49" charset="0"/>
+              </a:rPr>
+              <a:t>maincanvas</a:t>
+            </a:r>
+            <a:r>
+              <a:rPr lang="en-US" dirty="0">
+                <a:solidFill>
+                  <a:srgbClr val="BFBF00"/>
+                </a:solidFill>
+                <a:latin typeface="Lucida Console" panose="020B0609040504020204" pitchFamily="49" charset="0"/>
+              </a:rPr>
+              <a:t>'</a:t>
+            </a:r>
+            <a:r>
+              <a:rPr lang="en-US" dirty="0">
+                <a:solidFill>
+                  <a:prstClr val="black"/>
+                </a:solidFill>
+                <a:latin typeface="Lucida Console" panose="020B0609040504020204" pitchFamily="49" charset="0"/>
+              </a:rPr>
+              <a:t>).width</a:t>
+            </a:r>
+            <a:r>
+              <a:rPr lang="en-US" dirty="0" smtClean="0">
+                <a:solidFill>
+                  <a:prstClr val="black"/>
+                </a:solidFill>
+                <a:latin typeface="Lucida Console" panose="020B0609040504020204" pitchFamily="49" charset="0"/>
+              </a:rPr>
+              <a:t>(),</a:t>
+            </a:r>
+            <a:r>
+              <a:rPr lang="en-US" dirty="0" smtClean="0">
+                <a:solidFill>
+                  <a:srgbClr val="00BFBF"/>
+                </a:solidFill>
+                <a:latin typeface="Lucida Console" panose="020B0609040504020204" pitchFamily="49" charset="0"/>
+              </a:rPr>
+              <a:t>this</a:t>
+            </a:r>
+            <a:r>
+              <a:rPr lang="en-US" dirty="0">
+                <a:solidFill>
+                  <a:prstClr val="black"/>
+                </a:solidFill>
+                <a:latin typeface="Lucida Console" panose="020B0609040504020204" pitchFamily="49" charset="0"/>
+              </a:rPr>
+              <a:t>.$(</a:t>
+            </a:r>
+            <a:r>
+              <a:rPr lang="en-US" dirty="0">
+                <a:solidFill>
+                  <a:srgbClr val="BFBF00"/>
+                </a:solidFill>
+                <a:latin typeface="Lucida Console" panose="020B0609040504020204" pitchFamily="49" charset="0"/>
+              </a:rPr>
+              <a:t>'#</a:t>
+            </a:r>
+            <a:r>
+              <a:rPr lang="en-US" dirty="0" err="1">
+                <a:solidFill>
+                  <a:srgbClr val="BFBF00"/>
+                </a:solidFill>
+                <a:latin typeface="Lucida Console" panose="020B0609040504020204" pitchFamily="49" charset="0"/>
+              </a:rPr>
+              <a:t>maincanvas</a:t>
+            </a:r>
+            <a:r>
+              <a:rPr lang="en-US" dirty="0">
+                <a:solidFill>
+                  <a:srgbClr val="BFBF00"/>
+                </a:solidFill>
+                <a:latin typeface="Lucida Console" panose="020B0609040504020204" pitchFamily="49" charset="0"/>
+              </a:rPr>
+              <a:t>'</a:t>
+            </a:r>
+            <a:r>
+              <a:rPr lang="en-US" dirty="0">
+                <a:solidFill>
+                  <a:prstClr val="black"/>
+                </a:solidFill>
+                <a:latin typeface="Lucida Console" panose="020B0609040504020204" pitchFamily="49" charset="0"/>
+              </a:rPr>
+              <a:t>).height());</a:t>
+            </a:r>
+          </a:p>
+          <a:p>
+            <a:r>
+              <a:rPr lang="en-US" dirty="0" smtClean="0">
+                <a:solidFill>
+                  <a:srgbClr val="00BFBF"/>
+                </a:solidFill>
+                <a:latin typeface="Lucida Console" panose="020B0609040504020204" pitchFamily="49" charset="0"/>
+              </a:rPr>
+              <a:t>this</a:t>
+            </a:r>
+            <a:r>
+              <a:rPr lang="en-US" dirty="0">
+                <a:solidFill>
+                  <a:prstClr val="black"/>
+                </a:solidFill>
+                <a:latin typeface="Lucida Console" panose="020B0609040504020204" pitchFamily="49" charset="0"/>
+              </a:rPr>
+              <a:t>.$(</a:t>
+            </a:r>
+            <a:r>
+              <a:rPr lang="en-US" dirty="0">
+                <a:solidFill>
+                  <a:srgbClr val="BFBF00"/>
+                </a:solidFill>
+                <a:latin typeface="Lucida Console" panose="020B0609040504020204" pitchFamily="49" charset="0"/>
+              </a:rPr>
+              <a:t>'#</a:t>
+            </a:r>
+            <a:r>
+              <a:rPr lang="en-US" dirty="0" err="1">
+                <a:solidFill>
+                  <a:srgbClr val="BFBF00"/>
+                </a:solidFill>
+                <a:latin typeface="Lucida Console" panose="020B0609040504020204" pitchFamily="49" charset="0"/>
+              </a:rPr>
+              <a:t>maincanvas</a:t>
+            </a:r>
+            <a:r>
+              <a:rPr lang="en-US" dirty="0">
+                <a:solidFill>
+                  <a:srgbClr val="BFBF00"/>
+                </a:solidFill>
+                <a:latin typeface="Lucida Console" panose="020B0609040504020204" pitchFamily="49" charset="0"/>
+              </a:rPr>
+              <a:t>'</a:t>
+            </a:r>
+            <a:r>
+              <a:rPr lang="en-US" dirty="0">
+                <a:solidFill>
+                  <a:prstClr val="black"/>
+                </a:solidFill>
+                <a:latin typeface="Lucida Console" panose="020B0609040504020204" pitchFamily="49" charset="0"/>
+              </a:rPr>
+              <a:t>).append(</a:t>
+            </a:r>
+            <a:r>
+              <a:rPr lang="en-US" dirty="0" err="1">
+                <a:solidFill>
+                  <a:srgbClr val="00BFBF"/>
+                </a:solidFill>
+                <a:latin typeface="Lucida Console" panose="020B0609040504020204" pitchFamily="49" charset="0"/>
+              </a:rPr>
+              <a:t>this</a:t>
+            </a:r>
+            <a:r>
+              <a:rPr lang="en-US" dirty="0" err="1">
+                <a:solidFill>
+                  <a:prstClr val="black"/>
+                </a:solidFill>
+                <a:latin typeface="Lucida Console" panose="020B0609040504020204" pitchFamily="49" charset="0"/>
+              </a:rPr>
+              <a:t>.renderer.domElement</a:t>
+            </a:r>
+            <a:r>
+              <a:rPr lang="en-US" dirty="0">
+                <a:solidFill>
+                  <a:prstClr val="black"/>
+                </a:solidFill>
+                <a:latin typeface="Lucida Console" panose="020B0609040504020204" pitchFamily="49" charset="0"/>
+              </a:rPr>
+              <a:t>);</a:t>
+            </a:r>
+            <a:endParaRPr lang="en-US" dirty="0"/>
+          </a:p>
+        </p:txBody>
+      </p:sp>
+    </p:spTree>
+    <p:extLst>
+      <p:ext uri="{BB962C8B-B14F-4D97-AF65-F5344CB8AC3E}">
+        <p14:creationId xmlns:p14="http://schemas.microsoft.com/office/powerpoint/2010/main" val="3628520811"/>
       </p:ext>
     </p:extLst>
   </p:cSld>

</xml_diff>

<commit_message>
Added audio file formats to ppt
</commit_message>
<xml_diff>
--- a/notes/demo.pptx
+++ b/notes/demo.pptx
@@ -5673,7 +5673,15 @@
           <a:p>
             <a:r>
               <a:rPr lang="en-US" dirty="0" smtClean="0"/>
-              <a:t>Audio</a:t>
+              <a:t>Audio (mp3, wav, </a:t>
+            </a:r>
+            <a:r>
+              <a:rPr lang="en-US" dirty="0" err="1" smtClean="0"/>
+              <a:t>ogg</a:t>
+            </a:r>
+            <a:r>
+              <a:rPr lang="en-US" dirty="0" smtClean="0"/>
+              <a:t>)</a:t>
             </a:r>
             <a:endParaRPr lang="en-US" dirty="0"/>
           </a:p>

</xml_diff>